<commit_message>
add a message "random object practice" in the ppt
</commit_message>
<xml_diff>
--- a/Hero_Mora/bin/Release/Hero_Mora.pptx
+++ b/Hero_Mora/bin/Release/Hero_Mora.pptx
@@ -5954,7 +5954,19 @@
           <a:p>
             <a:r>
               <a:rPr lang="en-US" altLang="zh-TW" sz="2800" dirty="0" smtClean="0"/>
-              <a:t>Objectives : class practice</a:t>
+              <a:t>Objectives : </a:t>
+            </a:r>
+            <a:r>
+              <a:rPr lang="en-US" altLang="zh-TW" sz="2800" dirty="0" smtClean="0"/>
+              <a:t>random </a:t>
+            </a:r>
+            <a:r>
+              <a:rPr lang="en-US" altLang="zh-TW" sz="2800" smtClean="0"/>
+              <a:t>object and class </a:t>
+            </a:r>
+            <a:r>
+              <a:rPr lang="en-US" altLang="zh-TW" sz="2800" dirty="0" smtClean="0"/>
+              <a:t>practice</a:t>
             </a:r>
           </a:p>
           <a:p>

</xml_diff>

<commit_message>
modified:   Hero_Mora/bin/Release/Hero_Mora.exe 	modified:   Hero_Mora/bin/Release/Hero_Mora.pptx give up the thought giving the bitmap.cs to students instead, update all bitmaps in ppt file
</commit_message>
<xml_diff>
--- a/Hero_Mora/bin/Release/Hero_Mora.pptx
+++ b/Hero_Mora/bin/Release/Hero_Mora.pptx
@@ -12,8 +12,13 @@
     <p:sldId id="264" r:id="rId6"/>
     <p:sldId id="265" r:id="rId7"/>
     <p:sldId id="268" r:id="rId8"/>
-    <p:sldId id="266" r:id="rId9"/>
-    <p:sldId id="267" r:id="rId10"/>
+    <p:sldId id="269" r:id="rId9"/>
+    <p:sldId id="270" r:id="rId10"/>
+    <p:sldId id="271" r:id="rId11"/>
+    <p:sldId id="272" r:id="rId12"/>
+    <p:sldId id="273" r:id="rId13"/>
+    <p:sldId id="266" r:id="rId14"/>
+    <p:sldId id="267" r:id="rId15"/>
   </p:sldIdLst>
   <p:sldSz cx="12192000" cy="6858000"/>
   <p:notesSz cx="6858000" cy="9144000"/>
@@ -349,7 +354,7 @@
           <a:p>
             <a:fld id="{6992D42F-288A-499E-B279-D672B24F8207}" type="datetimeFigureOut">
               <a:rPr lang="zh-TW" altLang="en-US" smtClean="0"/>
-              <a:t>2018/9/22</a:t>
+              <a:t>2018/9/24</a:t>
             </a:fld>
             <a:endParaRPr lang="zh-TW" altLang="en-US"/>
           </a:p>
@@ -683,7 +688,7 @@
           <a:p>
             <a:fld id="{6992D42F-288A-499E-B279-D672B24F8207}" type="datetimeFigureOut">
               <a:rPr lang="zh-TW" altLang="en-US" smtClean="0"/>
-              <a:t>2018/9/22</a:t>
+              <a:t>2018/9/24</a:t>
             </a:fld>
             <a:endParaRPr lang="zh-TW" altLang="en-US"/>
           </a:p>
@@ -961,7 +966,7 @@
           <a:p>
             <a:fld id="{6992D42F-288A-499E-B279-D672B24F8207}" type="datetimeFigureOut">
               <a:rPr lang="zh-TW" altLang="en-US" smtClean="0"/>
-              <a:t>2018/9/22</a:t>
+              <a:t>2018/9/24</a:t>
             </a:fld>
             <a:endParaRPr lang="zh-TW" altLang="en-US"/>
           </a:p>
@@ -1529,7 +1534,7 @@
           <a:p>
             <a:fld id="{6992D42F-288A-499E-B279-D672B24F8207}" type="datetimeFigureOut">
               <a:rPr lang="zh-TW" altLang="en-US" smtClean="0"/>
-              <a:t>2018/9/22</a:t>
+              <a:t>2018/9/24</a:t>
             </a:fld>
             <a:endParaRPr lang="zh-TW" altLang="en-US"/>
           </a:p>
@@ -1807,7 +1812,7 @@
           <a:p>
             <a:fld id="{6992D42F-288A-499E-B279-D672B24F8207}" type="datetimeFigureOut">
               <a:rPr lang="zh-TW" altLang="en-US" smtClean="0"/>
-              <a:t>2018/9/22</a:t>
+              <a:t>2018/9/24</a:t>
             </a:fld>
             <a:endParaRPr lang="zh-TW" altLang="en-US"/>
           </a:p>
@@ -2369,7 +2374,7 @@
           <a:p>
             <a:fld id="{6992D42F-288A-499E-B279-D672B24F8207}" type="datetimeFigureOut">
               <a:rPr lang="zh-TW" altLang="en-US" smtClean="0"/>
-              <a:t>2018/9/22</a:t>
+              <a:t>2018/9/24</a:t>
             </a:fld>
             <a:endParaRPr lang="zh-TW" altLang="en-US"/>
           </a:p>
@@ -2696,7 +2701,7 @@
           <a:p>
             <a:fld id="{6992D42F-288A-499E-B279-D672B24F8207}" type="datetimeFigureOut">
               <a:rPr lang="zh-TW" altLang="en-US" smtClean="0"/>
-              <a:t>2018/9/22</a:t>
+              <a:t>2018/9/24</a:t>
             </a:fld>
             <a:endParaRPr lang="zh-TW" altLang="en-US"/>
           </a:p>
@@ -2901,7 +2906,7 @@
           <a:p>
             <a:fld id="{6992D42F-288A-499E-B279-D672B24F8207}" type="datetimeFigureOut">
               <a:rPr lang="zh-TW" altLang="en-US" smtClean="0"/>
-              <a:t>2018/9/22</a:t>
+              <a:t>2018/9/24</a:t>
             </a:fld>
             <a:endParaRPr lang="zh-TW" altLang="en-US"/>
           </a:p>
@@ -3111,7 +3116,7 @@
           <a:p>
             <a:fld id="{6992D42F-288A-499E-B279-D672B24F8207}" type="datetimeFigureOut">
               <a:rPr lang="zh-TW" altLang="en-US" smtClean="0"/>
-              <a:t>2018/9/22</a:t>
+              <a:t>2018/9/24</a:t>
             </a:fld>
             <a:endParaRPr lang="zh-TW" altLang="en-US"/>
           </a:p>
@@ -3311,7 +3316,7 @@
           <a:p>
             <a:fld id="{6992D42F-288A-499E-B279-D672B24F8207}" type="datetimeFigureOut">
               <a:rPr lang="zh-TW" altLang="en-US" smtClean="0"/>
-              <a:t>2018/9/22</a:t>
+              <a:t>2018/9/24</a:t>
             </a:fld>
             <a:endParaRPr lang="zh-TW" altLang="en-US"/>
           </a:p>
@@ -3587,7 +3592,7 @@
           <a:p>
             <a:fld id="{6992D42F-288A-499E-B279-D672B24F8207}" type="datetimeFigureOut">
               <a:rPr lang="zh-TW" altLang="en-US" smtClean="0"/>
-              <a:t>2018/9/22</a:t>
+              <a:t>2018/9/24</a:t>
             </a:fld>
             <a:endParaRPr lang="zh-TW" altLang="en-US"/>
           </a:p>
@@ -3853,7 +3858,7 @@
           <a:p>
             <a:fld id="{6992D42F-288A-499E-B279-D672B24F8207}" type="datetimeFigureOut">
               <a:rPr lang="zh-TW" altLang="en-US" smtClean="0"/>
-              <a:t>2018/9/22</a:t>
+              <a:t>2018/9/24</a:t>
             </a:fld>
             <a:endParaRPr lang="zh-TW" altLang="en-US"/>
           </a:p>
@@ -4227,7 +4232,7 @@
           <a:p>
             <a:fld id="{6992D42F-288A-499E-B279-D672B24F8207}" type="datetimeFigureOut">
               <a:rPr lang="zh-TW" altLang="en-US" smtClean="0"/>
-              <a:t>2018/9/22</a:t>
+              <a:t>2018/9/24</a:t>
             </a:fld>
             <a:endParaRPr lang="zh-TW" altLang="en-US"/>
           </a:p>
@@ -4375,7 +4380,7 @@
           <a:p>
             <a:fld id="{6992D42F-288A-499E-B279-D672B24F8207}" type="datetimeFigureOut">
               <a:rPr lang="zh-TW" altLang="en-US" smtClean="0"/>
-              <a:t>2018/9/22</a:t>
+              <a:t>2018/9/24</a:t>
             </a:fld>
             <a:endParaRPr lang="zh-TW" altLang="en-US"/>
           </a:p>
@@ -4500,7 +4505,7 @@
           <a:p>
             <a:fld id="{6992D42F-288A-499E-B279-D672B24F8207}" type="datetimeFigureOut">
               <a:rPr lang="zh-TW" altLang="en-US" smtClean="0"/>
-              <a:t>2018/9/22</a:t>
+              <a:t>2018/9/24</a:t>
             </a:fld>
             <a:endParaRPr lang="zh-TW" altLang="en-US"/>
           </a:p>
@@ -4785,7 +4790,7 @@
           <a:p>
             <a:fld id="{6992D42F-288A-499E-B279-D672B24F8207}" type="datetimeFigureOut">
               <a:rPr lang="zh-TW" altLang="en-US" smtClean="0"/>
-              <a:t>2018/9/22</a:t>
+              <a:t>2018/9/24</a:t>
             </a:fld>
             <a:endParaRPr lang="zh-TW" altLang="en-US"/>
           </a:p>
@@ -5109,7 +5114,7 @@
           <a:p>
             <a:fld id="{6992D42F-288A-499E-B279-D672B24F8207}" type="datetimeFigureOut">
               <a:rPr lang="zh-TW" altLang="en-US" smtClean="0"/>
-              <a:t>2018/9/22</a:t>
+              <a:t>2018/9/24</a:t>
             </a:fld>
             <a:endParaRPr lang="zh-TW" altLang="en-US"/>
           </a:p>
@@ -5323,7 +5328,7 @@
           <a:p>
             <a:fld id="{6992D42F-288A-499E-B279-D672B24F8207}" type="datetimeFigureOut">
               <a:rPr lang="zh-TW" altLang="en-US" smtClean="0"/>
-              <a:t>2018/9/22</a:t>
+              <a:t>2018/9/24</a:t>
             </a:fld>
             <a:endParaRPr lang="zh-TW" altLang="en-US"/>
           </a:p>
@@ -5895,6 +5900,537 @@
 </p:sld>
 </file>
 
+<file path=ppt/slides/slide10.xml><?xml version="1.0" encoding="utf-8"?>
+<p:sld xmlns:a="http://schemas.openxmlformats.org/drawingml/2006/main" xmlns:r="http://schemas.openxmlformats.org/officeDocument/2006/relationships" xmlns:p="http://schemas.openxmlformats.org/presentationml/2006/main">
+  <p:cSld>
+    <p:spTree>
+      <p:nvGrpSpPr>
+        <p:cNvPr id="1" name=""/>
+        <p:cNvGrpSpPr/>
+        <p:nvPr/>
+      </p:nvGrpSpPr>
+      <p:grpSpPr>
+        <a:xfrm>
+          <a:off x="0" y="0"/>
+          <a:ext cx="0" cy="0"/>
+          <a:chOff x="0" y="0"/>
+          <a:chExt cx="0" cy="0"/>
+        </a:xfrm>
+      </p:grpSpPr>
+      <p:sp>
+        <p:nvSpPr>
+          <p:cNvPr id="2" name="標題 1"/>
+          <p:cNvSpPr>
+            <a:spLocks noGrp="1"/>
+          </p:cNvSpPr>
+          <p:nvPr>
+            <p:ph type="title"/>
+          </p:nvPr>
+        </p:nvSpPr>
+        <p:spPr/>
+        <p:txBody>
+          <a:bodyPr/>
+          <a:lstStyle/>
+          <a:p>
+            <a:r>
+              <a:rPr lang="en-US" altLang="zh-TW" dirty="0" err="1" smtClean="0"/>
+              <a:t>Hero_mora</a:t>
+            </a:r>
+            <a:endParaRPr lang="zh-TW" altLang="en-US" dirty="0"/>
+          </a:p>
+        </p:txBody>
+      </p:sp>
+      <p:sp>
+        <p:nvSpPr>
+          <p:cNvPr id="3" name="內容版面配置區 2"/>
+          <p:cNvSpPr>
+            <a:spLocks noGrp="1"/>
+          </p:cNvSpPr>
+          <p:nvPr>
+            <p:ph idx="1"/>
+          </p:nvPr>
+        </p:nvSpPr>
+        <p:spPr>
+          <a:xfrm>
+            <a:off x="685801" y="2142067"/>
+            <a:ext cx="7406639" cy="3649133"/>
+          </a:xfrm>
+        </p:spPr>
+        <p:txBody>
+          <a:bodyPr>
+            <a:normAutofit/>
+          </a:bodyPr>
+          <a:lstStyle/>
+          <a:p>
+            <a:r>
+              <a:rPr lang="en-US" altLang="zh-TW" sz="2400" dirty="0" smtClean="0"/>
+              <a:t>Sword bitmap</a:t>
+            </a:r>
+            <a:endParaRPr lang="en-US" altLang="zh-TW" sz="2400" dirty="0">
+              <a:solidFill>
+                <a:srgbClr val="FF0000"/>
+              </a:solidFill>
+            </a:endParaRPr>
+          </a:p>
+        </p:txBody>
+      </p:sp>
+      <p:pic>
+        <p:nvPicPr>
+          <p:cNvPr id="5" name="圖片 4"/>
+          <p:cNvPicPr>
+            <a:picLocks noChangeAspect="1"/>
+          </p:cNvPicPr>
+          <p:nvPr/>
+        </p:nvPicPr>
+        <p:blipFill>
+          <a:blip r:embed="rId2">
+            <a:extLst>
+              <a:ext uri="{28A0092B-C50C-407E-A947-70E740481C1C}">
+                <a14:useLocalDpi xmlns:a14="http://schemas.microsoft.com/office/drawing/2010/main" val="0"/>
+              </a:ext>
+            </a:extLst>
+          </a:blip>
+          <a:stretch>
+            <a:fillRect/>
+          </a:stretch>
+        </p:blipFill>
+        <p:spPr>
+          <a:xfrm>
+            <a:off x="8873720" y="1574760"/>
+            <a:ext cx="2552350" cy="4783745"/>
+          </a:xfrm>
+          <a:prstGeom prst="rect">
+            <a:avLst/>
+          </a:prstGeom>
+        </p:spPr>
+      </p:pic>
+    </p:spTree>
+    <p:extLst>
+      <p:ext uri="{BB962C8B-B14F-4D97-AF65-F5344CB8AC3E}">
+        <p14:creationId xmlns:p14="http://schemas.microsoft.com/office/powerpoint/2010/main" val="1559647610"/>
+      </p:ext>
+    </p:extLst>
+  </p:cSld>
+  <p:clrMapOvr>
+    <a:masterClrMapping/>
+  </p:clrMapOvr>
+</p:sld>
+</file>
+
+<file path=ppt/slides/slide11.xml><?xml version="1.0" encoding="utf-8"?>
+<p:sld xmlns:a="http://schemas.openxmlformats.org/drawingml/2006/main" xmlns:r="http://schemas.openxmlformats.org/officeDocument/2006/relationships" xmlns:p="http://schemas.openxmlformats.org/presentationml/2006/main">
+  <p:cSld>
+    <p:spTree>
+      <p:nvGrpSpPr>
+        <p:cNvPr id="1" name=""/>
+        <p:cNvGrpSpPr/>
+        <p:nvPr/>
+      </p:nvGrpSpPr>
+      <p:grpSpPr>
+        <a:xfrm>
+          <a:off x="0" y="0"/>
+          <a:ext cx="0" cy="0"/>
+          <a:chOff x="0" y="0"/>
+          <a:chExt cx="0" cy="0"/>
+        </a:xfrm>
+      </p:grpSpPr>
+      <p:sp>
+        <p:nvSpPr>
+          <p:cNvPr id="2" name="標題 1"/>
+          <p:cNvSpPr>
+            <a:spLocks noGrp="1"/>
+          </p:cNvSpPr>
+          <p:nvPr>
+            <p:ph type="title"/>
+          </p:nvPr>
+        </p:nvSpPr>
+        <p:spPr/>
+        <p:txBody>
+          <a:bodyPr/>
+          <a:lstStyle/>
+          <a:p>
+            <a:r>
+              <a:rPr lang="en-US" altLang="zh-TW" dirty="0" err="1" smtClean="0"/>
+              <a:t>Hero_mora</a:t>
+            </a:r>
+            <a:endParaRPr lang="zh-TW" altLang="en-US" dirty="0"/>
+          </a:p>
+        </p:txBody>
+      </p:sp>
+      <p:sp>
+        <p:nvSpPr>
+          <p:cNvPr id="3" name="內容版面配置區 2"/>
+          <p:cNvSpPr>
+            <a:spLocks noGrp="1"/>
+          </p:cNvSpPr>
+          <p:nvPr>
+            <p:ph idx="1"/>
+          </p:nvPr>
+        </p:nvSpPr>
+        <p:spPr>
+          <a:xfrm>
+            <a:off x="685801" y="2142067"/>
+            <a:ext cx="7406639" cy="3649133"/>
+          </a:xfrm>
+        </p:spPr>
+        <p:txBody>
+          <a:bodyPr>
+            <a:normAutofit/>
+          </a:bodyPr>
+          <a:lstStyle/>
+          <a:p>
+            <a:r>
+              <a:rPr lang="en-US" altLang="zh-TW" sz="2400" dirty="0" smtClean="0"/>
+              <a:t>Hammer bitmap</a:t>
+            </a:r>
+            <a:endParaRPr lang="en-US" altLang="zh-TW" sz="2400" dirty="0">
+              <a:solidFill>
+                <a:srgbClr val="FF0000"/>
+              </a:solidFill>
+            </a:endParaRPr>
+          </a:p>
+        </p:txBody>
+      </p:sp>
+      <p:pic>
+        <p:nvPicPr>
+          <p:cNvPr id="5" name="圖片 4"/>
+          <p:cNvPicPr>
+            <a:picLocks noChangeAspect="1"/>
+          </p:cNvPicPr>
+          <p:nvPr/>
+        </p:nvPicPr>
+        <p:blipFill>
+          <a:blip r:embed="rId2">
+            <a:extLst>
+              <a:ext uri="{28A0092B-C50C-407E-A947-70E740481C1C}">
+                <a14:useLocalDpi xmlns:a14="http://schemas.microsoft.com/office/drawing/2010/main" val="0"/>
+              </a:ext>
+            </a:extLst>
+          </a:blip>
+          <a:stretch>
+            <a:fillRect/>
+          </a:stretch>
+        </p:blipFill>
+        <p:spPr>
+          <a:xfrm>
+            <a:off x="8873720" y="1560351"/>
+            <a:ext cx="2552350" cy="4812562"/>
+          </a:xfrm>
+          <a:prstGeom prst="rect">
+            <a:avLst/>
+          </a:prstGeom>
+        </p:spPr>
+      </p:pic>
+    </p:spTree>
+    <p:extLst>
+      <p:ext uri="{BB962C8B-B14F-4D97-AF65-F5344CB8AC3E}">
+        <p14:creationId xmlns:p14="http://schemas.microsoft.com/office/powerpoint/2010/main" val="3604101291"/>
+      </p:ext>
+    </p:extLst>
+  </p:cSld>
+  <p:clrMapOvr>
+    <a:masterClrMapping/>
+  </p:clrMapOvr>
+</p:sld>
+</file>
+
+<file path=ppt/slides/slide12.xml><?xml version="1.0" encoding="utf-8"?>
+<p:sld xmlns:a="http://schemas.openxmlformats.org/drawingml/2006/main" xmlns:r="http://schemas.openxmlformats.org/officeDocument/2006/relationships" xmlns:p="http://schemas.openxmlformats.org/presentationml/2006/main">
+  <p:cSld>
+    <p:spTree>
+      <p:nvGrpSpPr>
+        <p:cNvPr id="1" name=""/>
+        <p:cNvGrpSpPr/>
+        <p:nvPr/>
+      </p:nvGrpSpPr>
+      <p:grpSpPr>
+        <a:xfrm>
+          <a:off x="0" y="0"/>
+          <a:ext cx="0" cy="0"/>
+          <a:chOff x="0" y="0"/>
+          <a:chExt cx="0" cy="0"/>
+        </a:xfrm>
+      </p:grpSpPr>
+      <p:sp>
+        <p:nvSpPr>
+          <p:cNvPr id="2" name="標題 1"/>
+          <p:cNvSpPr>
+            <a:spLocks noGrp="1"/>
+          </p:cNvSpPr>
+          <p:nvPr>
+            <p:ph type="title"/>
+          </p:nvPr>
+        </p:nvSpPr>
+        <p:spPr/>
+        <p:txBody>
+          <a:bodyPr/>
+          <a:lstStyle/>
+          <a:p>
+            <a:r>
+              <a:rPr lang="en-US" altLang="zh-TW" dirty="0" err="1" smtClean="0"/>
+              <a:t>Hero_mora</a:t>
+            </a:r>
+            <a:endParaRPr lang="zh-TW" altLang="en-US" dirty="0"/>
+          </a:p>
+        </p:txBody>
+      </p:sp>
+      <p:sp>
+        <p:nvSpPr>
+          <p:cNvPr id="3" name="內容版面配置區 2"/>
+          <p:cNvSpPr>
+            <a:spLocks noGrp="1"/>
+          </p:cNvSpPr>
+          <p:nvPr>
+            <p:ph idx="1"/>
+          </p:nvPr>
+        </p:nvSpPr>
+        <p:spPr>
+          <a:xfrm>
+            <a:off x="685801" y="2142067"/>
+            <a:ext cx="7406639" cy="3649133"/>
+          </a:xfrm>
+        </p:spPr>
+        <p:txBody>
+          <a:bodyPr>
+            <a:normAutofit/>
+          </a:bodyPr>
+          <a:lstStyle/>
+          <a:p>
+            <a:r>
+              <a:rPr lang="en-US" altLang="zh-TW" sz="2400" dirty="0" smtClean="0"/>
+              <a:t>Spear bitmap</a:t>
+            </a:r>
+            <a:endParaRPr lang="en-US" altLang="zh-TW" sz="2400" dirty="0">
+              <a:solidFill>
+                <a:srgbClr val="FF0000"/>
+              </a:solidFill>
+            </a:endParaRPr>
+          </a:p>
+        </p:txBody>
+      </p:sp>
+      <p:pic>
+        <p:nvPicPr>
+          <p:cNvPr id="5" name="圖片 4"/>
+          <p:cNvPicPr>
+            <a:picLocks noChangeAspect="1"/>
+          </p:cNvPicPr>
+          <p:nvPr/>
+        </p:nvPicPr>
+        <p:blipFill>
+          <a:blip r:embed="rId2">
+            <a:extLst>
+              <a:ext uri="{28A0092B-C50C-407E-A947-70E740481C1C}">
+                <a14:useLocalDpi xmlns:a14="http://schemas.microsoft.com/office/drawing/2010/main" val="0"/>
+              </a:ext>
+            </a:extLst>
+          </a:blip>
+          <a:stretch>
+            <a:fillRect/>
+          </a:stretch>
+        </p:blipFill>
+        <p:spPr>
+          <a:xfrm>
+            <a:off x="8873720" y="1739582"/>
+            <a:ext cx="2552350" cy="4454101"/>
+          </a:xfrm>
+          <a:prstGeom prst="rect">
+            <a:avLst/>
+          </a:prstGeom>
+        </p:spPr>
+      </p:pic>
+    </p:spTree>
+    <p:extLst>
+      <p:ext uri="{BB962C8B-B14F-4D97-AF65-F5344CB8AC3E}">
+        <p14:creationId xmlns:p14="http://schemas.microsoft.com/office/powerpoint/2010/main" val="3808336123"/>
+      </p:ext>
+    </p:extLst>
+  </p:cSld>
+  <p:clrMapOvr>
+    <a:masterClrMapping/>
+  </p:clrMapOvr>
+</p:sld>
+</file>
+
+<file path=ppt/slides/slide13.xml><?xml version="1.0" encoding="utf-8"?>
+<p:sld xmlns:a="http://schemas.openxmlformats.org/drawingml/2006/main" xmlns:r="http://schemas.openxmlformats.org/officeDocument/2006/relationships" xmlns:p="http://schemas.openxmlformats.org/presentationml/2006/main">
+  <p:cSld>
+    <p:spTree>
+      <p:nvGrpSpPr>
+        <p:cNvPr id="1" name=""/>
+        <p:cNvGrpSpPr/>
+        <p:nvPr/>
+      </p:nvGrpSpPr>
+      <p:grpSpPr>
+        <a:xfrm>
+          <a:off x="0" y="0"/>
+          <a:ext cx="0" cy="0"/>
+          <a:chOff x="0" y="0"/>
+          <a:chExt cx="0" cy="0"/>
+        </a:xfrm>
+      </p:grpSpPr>
+      <p:sp>
+        <p:nvSpPr>
+          <p:cNvPr id="2" name="標題 1"/>
+          <p:cNvSpPr>
+            <a:spLocks noGrp="1"/>
+          </p:cNvSpPr>
+          <p:nvPr>
+            <p:ph type="title"/>
+          </p:nvPr>
+        </p:nvSpPr>
+        <p:spPr/>
+        <p:txBody>
+          <a:bodyPr/>
+          <a:lstStyle/>
+          <a:p>
+            <a:r>
+              <a:rPr lang="en-US" altLang="zh-TW" dirty="0" err="1" smtClean="0"/>
+              <a:t>Hero_mora</a:t>
+            </a:r>
+            <a:endParaRPr lang="zh-TW" altLang="en-US" dirty="0"/>
+          </a:p>
+        </p:txBody>
+      </p:sp>
+      <p:sp>
+        <p:nvSpPr>
+          <p:cNvPr id="3" name="內容版面配置區 2"/>
+          <p:cNvSpPr>
+            <a:spLocks noGrp="1"/>
+          </p:cNvSpPr>
+          <p:nvPr>
+            <p:ph idx="1"/>
+          </p:nvPr>
+        </p:nvSpPr>
+        <p:spPr>
+          <a:xfrm>
+            <a:off x="685801" y="2142067"/>
+            <a:ext cx="10744199" cy="3649133"/>
+          </a:xfrm>
+        </p:spPr>
+        <p:txBody>
+          <a:bodyPr>
+            <a:normAutofit/>
+          </a:bodyPr>
+          <a:lstStyle/>
+          <a:p>
+            <a:pPr marL="0" indent="0" algn="ctr">
+              <a:buNone/>
+            </a:pPr>
+            <a:r>
+              <a:rPr lang="en-US" altLang="zh-TW" sz="4800" dirty="0" smtClean="0"/>
+              <a:t>Any questions?</a:t>
+            </a:r>
+            <a:endParaRPr lang="en-US" altLang="zh-TW" sz="4800" dirty="0">
+              <a:solidFill>
+                <a:srgbClr val="FF0000"/>
+              </a:solidFill>
+            </a:endParaRPr>
+          </a:p>
+        </p:txBody>
+      </p:sp>
+    </p:spTree>
+    <p:extLst>
+      <p:ext uri="{BB962C8B-B14F-4D97-AF65-F5344CB8AC3E}">
+        <p14:creationId xmlns:p14="http://schemas.microsoft.com/office/powerpoint/2010/main" val="2319945399"/>
+      </p:ext>
+    </p:extLst>
+  </p:cSld>
+  <p:clrMapOvr>
+    <a:masterClrMapping/>
+  </p:clrMapOvr>
+</p:sld>
+</file>
+
+<file path=ppt/slides/slide14.xml><?xml version="1.0" encoding="utf-8"?>
+<p:sld xmlns:a="http://schemas.openxmlformats.org/drawingml/2006/main" xmlns:r="http://schemas.openxmlformats.org/officeDocument/2006/relationships" xmlns:p="http://schemas.openxmlformats.org/presentationml/2006/main">
+  <p:cSld>
+    <p:spTree>
+      <p:nvGrpSpPr>
+        <p:cNvPr id="1" name=""/>
+        <p:cNvGrpSpPr/>
+        <p:nvPr/>
+      </p:nvGrpSpPr>
+      <p:grpSpPr>
+        <a:xfrm>
+          <a:off x="0" y="0"/>
+          <a:ext cx="0" cy="0"/>
+          <a:chOff x="0" y="0"/>
+          <a:chExt cx="0" cy="0"/>
+        </a:xfrm>
+      </p:grpSpPr>
+      <p:sp>
+        <p:nvSpPr>
+          <p:cNvPr id="2" name="標題 1"/>
+          <p:cNvSpPr>
+            <a:spLocks noGrp="1"/>
+          </p:cNvSpPr>
+          <p:nvPr>
+            <p:ph type="title"/>
+          </p:nvPr>
+        </p:nvSpPr>
+        <p:spPr/>
+        <p:txBody>
+          <a:bodyPr/>
+          <a:lstStyle/>
+          <a:p>
+            <a:r>
+              <a:rPr lang="en-US" altLang="zh-TW" dirty="0" err="1" smtClean="0"/>
+              <a:t>Hero_mora</a:t>
+            </a:r>
+            <a:endParaRPr lang="zh-TW" altLang="en-US" dirty="0"/>
+          </a:p>
+        </p:txBody>
+      </p:sp>
+      <p:sp>
+        <p:nvSpPr>
+          <p:cNvPr id="3" name="內容版面配置區 2"/>
+          <p:cNvSpPr>
+            <a:spLocks noGrp="1"/>
+          </p:cNvSpPr>
+          <p:nvPr>
+            <p:ph idx="1"/>
+          </p:nvPr>
+        </p:nvSpPr>
+        <p:spPr>
+          <a:xfrm>
+            <a:off x="685801" y="2142067"/>
+            <a:ext cx="10744199" cy="3649133"/>
+          </a:xfrm>
+        </p:spPr>
+        <p:txBody>
+          <a:bodyPr>
+            <a:normAutofit/>
+          </a:bodyPr>
+          <a:lstStyle/>
+          <a:p>
+            <a:pPr marL="0" indent="0" algn="ctr">
+              <a:buNone/>
+            </a:pPr>
+            <a:r>
+              <a:rPr lang="en-US" altLang="zh-TW" sz="4800" dirty="0" smtClean="0"/>
+              <a:t>Good luck!</a:t>
+            </a:r>
+            <a:endParaRPr lang="en-US" altLang="zh-TW" sz="4800" dirty="0">
+              <a:solidFill>
+                <a:srgbClr val="FF0000"/>
+              </a:solidFill>
+            </a:endParaRPr>
+          </a:p>
+        </p:txBody>
+      </p:sp>
+    </p:spTree>
+    <p:extLst>
+      <p:ext uri="{BB962C8B-B14F-4D97-AF65-F5344CB8AC3E}">
+        <p14:creationId xmlns:p14="http://schemas.microsoft.com/office/powerpoint/2010/main" val="41406765"/>
+      </p:ext>
+    </p:extLst>
+  </p:cSld>
+  <p:clrMapOvr>
+    <a:masterClrMapping/>
+  </p:clrMapOvr>
+</p:sld>
+</file>
+
 <file path=ppt/slides/slide2.xml><?xml version="1.0" encoding="utf-8"?>
 <p:sld xmlns:a="http://schemas.openxmlformats.org/drawingml/2006/main" xmlns:r="http://schemas.openxmlformats.org/officeDocument/2006/relationships" xmlns:p="http://schemas.openxmlformats.org/presentationml/2006/main">
   <p:cSld>
@@ -5954,11 +6490,7 @@
           <a:p>
             <a:r>
               <a:rPr lang="en-US" altLang="zh-TW" sz="2800" dirty="0" smtClean="0"/>
-              <a:t>Objectives : </a:t>
-            </a:r>
-            <a:r>
-              <a:rPr lang="en-US" altLang="zh-TW" sz="2800" dirty="0" smtClean="0"/>
-              <a:t>random </a:t>
+              <a:t>Objectives : random </a:t>
             </a:r>
             <a:r>
               <a:rPr lang="en-US" altLang="zh-TW" sz="2800" smtClean="0"/>
@@ -7327,26 +7859,19 @@
           <a:p>
             <a:r>
               <a:rPr lang="en-US" altLang="zh-TW" sz="2400" dirty="0"/>
-              <a:t>We will provide a Bitmap </a:t>
+              <a:t>We will provide </a:t>
             </a:r>
             <a:r>
               <a:rPr lang="en-US" altLang="zh-TW" sz="2400" dirty="0" smtClean="0"/>
-              <a:t>class file</a:t>
+              <a:t>all images you need; that is, the bitmaps of hero, monster and basic weapons</a:t>
             </a:r>
           </a:p>
           <a:p>
             <a:r>
               <a:rPr lang="en-US" altLang="zh-TW" sz="2400" dirty="0" smtClean="0"/>
-              <a:t>In the class file are the </a:t>
-            </a:r>
-            <a:r>
-              <a:rPr lang="en-US" altLang="zh-TW" sz="2400" dirty="0"/>
-              <a:t>bitmaps of </a:t>
-            </a:r>
-            <a:r>
-              <a:rPr lang="en-US" altLang="zh-TW" sz="2400" dirty="0" smtClean="0"/>
-              <a:t>hero, monster and basic weapons</a:t>
-            </a:r>
+              <a:t>The height and width of each bitmap are 11 bits</a:t>
+            </a:r>
+            <a:endParaRPr lang="en-US" altLang="zh-TW" sz="2400" dirty="0" smtClean="0"/>
           </a:p>
           <a:p>
             <a:r>
@@ -7465,7 +7990,7 @@
         <p:spPr>
           <a:xfrm>
             <a:off x="685801" y="2142067"/>
-            <a:ext cx="10744199" cy="3649133"/>
+            <a:ext cx="7406639" cy="3649133"/>
           </a:xfrm>
         </p:spPr>
         <p:txBody>
@@ -7474,14 +7999,11 @@
           </a:bodyPr>
           <a:lstStyle/>
           <a:p>
-            <a:pPr marL="0" indent="0" algn="ctr">
-              <a:buNone/>
-            </a:pPr>
-            <a:r>
-              <a:rPr lang="en-US" altLang="zh-TW" sz="4800" dirty="0" smtClean="0"/>
-              <a:t>Any questions?</a:t>
-            </a:r>
-            <a:endParaRPr lang="en-US" altLang="zh-TW" sz="4800" dirty="0">
+            <a:r>
+              <a:rPr lang="en-US" altLang="zh-TW" sz="2400" dirty="0" smtClean="0"/>
+              <a:t>Hero bitmap</a:t>
+            </a:r>
+            <a:endParaRPr lang="en-US" altLang="zh-TW" sz="2400" dirty="0">
               <a:solidFill>
                 <a:srgbClr val="FF0000"/>
               </a:solidFill>
@@ -7489,10 +8011,40 @@
           </a:p>
         </p:txBody>
       </p:sp>
+      <p:pic>
+        <p:nvPicPr>
+          <p:cNvPr id="5" name="圖片 4"/>
+          <p:cNvPicPr>
+            <a:picLocks noChangeAspect="1"/>
+          </p:cNvPicPr>
+          <p:nvPr/>
+        </p:nvPicPr>
+        <p:blipFill>
+          <a:blip r:embed="rId2">
+            <a:extLst>
+              <a:ext uri="{28A0092B-C50C-407E-A947-70E740481C1C}">
+                <a14:useLocalDpi xmlns:a14="http://schemas.microsoft.com/office/drawing/2010/main" val="0"/>
+              </a:ext>
+            </a:extLst>
+          </a:blip>
+          <a:stretch>
+            <a:fillRect/>
+          </a:stretch>
+        </p:blipFill>
+        <p:spPr>
+          <a:xfrm>
+            <a:off x="8843671" y="1523224"/>
+            <a:ext cx="2612449" cy="4886817"/>
+          </a:xfrm>
+          <a:prstGeom prst="rect">
+            <a:avLst/>
+          </a:prstGeom>
+        </p:spPr>
+      </p:pic>
     </p:spTree>
     <p:extLst>
       <p:ext uri="{BB962C8B-B14F-4D97-AF65-F5344CB8AC3E}">
-        <p14:creationId xmlns:p14="http://schemas.microsoft.com/office/powerpoint/2010/main" val="2319945399"/>
+        <p14:creationId xmlns:p14="http://schemas.microsoft.com/office/powerpoint/2010/main" val="810994412"/>
       </p:ext>
     </p:extLst>
   </p:cSld>
@@ -7555,7 +8107,7 @@
         <p:spPr>
           <a:xfrm>
             <a:off x="685801" y="2142067"/>
-            <a:ext cx="10744199" cy="3649133"/>
+            <a:ext cx="7406639" cy="3649133"/>
           </a:xfrm>
         </p:spPr>
         <p:txBody>
@@ -7564,14 +8116,11 @@
           </a:bodyPr>
           <a:lstStyle/>
           <a:p>
-            <a:pPr marL="0" indent="0" algn="ctr">
-              <a:buNone/>
-            </a:pPr>
-            <a:r>
-              <a:rPr lang="en-US" altLang="zh-TW" sz="4800" dirty="0" smtClean="0"/>
-              <a:t>Good luck!</a:t>
-            </a:r>
-            <a:endParaRPr lang="en-US" altLang="zh-TW" sz="4800" dirty="0">
+            <a:r>
+              <a:rPr lang="en-US" altLang="zh-TW" sz="2400" dirty="0" smtClean="0"/>
+              <a:t>Monster(slime) bitmap</a:t>
+            </a:r>
+            <a:endParaRPr lang="en-US" altLang="zh-TW" sz="2400" dirty="0">
               <a:solidFill>
                 <a:srgbClr val="FF0000"/>
               </a:solidFill>
@@ -7579,10 +8128,40 @@
           </a:p>
         </p:txBody>
       </p:sp>
+      <p:pic>
+        <p:nvPicPr>
+          <p:cNvPr id="5" name="圖片 4"/>
+          <p:cNvPicPr>
+            <a:picLocks noChangeAspect="1"/>
+          </p:cNvPicPr>
+          <p:nvPr/>
+        </p:nvPicPr>
+        <p:blipFill>
+          <a:blip r:embed="rId2">
+            <a:extLst>
+              <a:ext uri="{28A0092B-C50C-407E-A947-70E740481C1C}">
+                <a14:useLocalDpi xmlns:a14="http://schemas.microsoft.com/office/drawing/2010/main" val="0"/>
+              </a:ext>
+            </a:extLst>
+          </a:blip>
+          <a:stretch>
+            <a:fillRect/>
+          </a:stretch>
+        </p:blipFill>
+        <p:spPr>
+          <a:xfrm>
+            <a:off x="8873720" y="1523224"/>
+            <a:ext cx="2552350" cy="4886817"/>
+          </a:xfrm>
+          <a:prstGeom prst="rect">
+            <a:avLst/>
+          </a:prstGeom>
+        </p:spPr>
+      </p:pic>
     </p:spTree>
     <p:extLst>
       <p:ext uri="{BB962C8B-B14F-4D97-AF65-F5344CB8AC3E}">
-        <p14:creationId xmlns:p14="http://schemas.microsoft.com/office/powerpoint/2010/main" val="41406765"/>
+        <p14:creationId xmlns:p14="http://schemas.microsoft.com/office/powerpoint/2010/main" val="2176469188"/>
       </p:ext>
     </p:extLst>
   </p:cSld>

</xml_diff>

<commit_message>
change the images of bitmap into the word windows of it in ppt
</commit_message>
<xml_diff>
--- a/Hero_Mora/bin/Release/Hero_Mora.pptx
+++ b/Hero_Mora/bin/Release/Hero_Mora.pptx
@@ -354,7 +354,7 @@
           <a:p>
             <a:fld id="{6992D42F-288A-499E-B279-D672B24F8207}" type="datetimeFigureOut">
               <a:rPr lang="zh-TW" altLang="en-US" smtClean="0"/>
-              <a:t>2018/9/24</a:t>
+              <a:t>2018/9/25</a:t>
             </a:fld>
             <a:endParaRPr lang="zh-TW" altLang="en-US"/>
           </a:p>
@@ -688,7 +688,7 @@
           <a:p>
             <a:fld id="{6992D42F-288A-499E-B279-D672B24F8207}" type="datetimeFigureOut">
               <a:rPr lang="zh-TW" altLang="en-US" smtClean="0"/>
-              <a:t>2018/9/24</a:t>
+              <a:t>2018/9/25</a:t>
             </a:fld>
             <a:endParaRPr lang="zh-TW" altLang="en-US"/>
           </a:p>
@@ -966,7 +966,7 @@
           <a:p>
             <a:fld id="{6992D42F-288A-499E-B279-D672B24F8207}" type="datetimeFigureOut">
               <a:rPr lang="zh-TW" altLang="en-US" smtClean="0"/>
-              <a:t>2018/9/24</a:t>
+              <a:t>2018/9/25</a:t>
             </a:fld>
             <a:endParaRPr lang="zh-TW" altLang="en-US"/>
           </a:p>
@@ -1534,7 +1534,7 @@
           <a:p>
             <a:fld id="{6992D42F-288A-499E-B279-D672B24F8207}" type="datetimeFigureOut">
               <a:rPr lang="zh-TW" altLang="en-US" smtClean="0"/>
-              <a:t>2018/9/24</a:t>
+              <a:t>2018/9/25</a:t>
             </a:fld>
             <a:endParaRPr lang="zh-TW" altLang="en-US"/>
           </a:p>
@@ -1812,7 +1812,7 @@
           <a:p>
             <a:fld id="{6992D42F-288A-499E-B279-D672B24F8207}" type="datetimeFigureOut">
               <a:rPr lang="zh-TW" altLang="en-US" smtClean="0"/>
-              <a:t>2018/9/24</a:t>
+              <a:t>2018/9/25</a:t>
             </a:fld>
             <a:endParaRPr lang="zh-TW" altLang="en-US"/>
           </a:p>
@@ -2374,7 +2374,7 @@
           <a:p>
             <a:fld id="{6992D42F-288A-499E-B279-D672B24F8207}" type="datetimeFigureOut">
               <a:rPr lang="zh-TW" altLang="en-US" smtClean="0"/>
-              <a:t>2018/9/24</a:t>
+              <a:t>2018/9/25</a:t>
             </a:fld>
             <a:endParaRPr lang="zh-TW" altLang="en-US"/>
           </a:p>
@@ -2701,7 +2701,7 @@
           <a:p>
             <a:fld id="{6992D42F-288A-499E-B279-D672B24F8207}" type="datetimeFigureOut">
               <a:rPr lang="zh-TW" altLang="en-US" smtClean="0"/>
-              <a:t>2018/9/24</a:t>
+              <a:t>2018/9/25</a:t>
             </a:fld>
             <a:endParaRPr lang="zh-TW" altLang="en-US"/>
           </a:p>
@@ -2906,7 +2906,7 @@
           <a:p>
             <a:fld id="{6992D42F-288A-499E-B279-D672B24F8207}" type="datetimeFigureOut">
               <a:rPr lang="zh-TW" altLang="en-US" smtClean="0"/>
-              <a:t>2018/9/24</a:t>
+              <a:t>2018/9/25</a:t>
             </a:fld>
             <a:endParaRPr lang="zh-TW" altLang="en-US"/>
           </a:p>
@@ -3116,7 +3116,7 @@
           <a:p>
             <a:fld id="{6992D42F-288A-499E-B279-D672B24F8207}" type="datetimeFigureOut">
               <a:rPr lang="zh-TW" altLang="en-US" smtClean="0"/>
-              <a:t>2018/9/24</a:t>
+              <a:t>2018/9/25</a:t>
             </a:fld>
             <a:endParaRPr lang="zh-TW" altLang="en-US"/>
           </a:p>
@@ -3316,7 +3316,7 @@
           <a:p>
             <a:fld id="{6992D42F-288A-499E-B279-D672B24F8207}" type="datetimeFigureOut">
               <a:rPr lang="zh-TW" altLang="en-US" smtClean="0"/>
-              <a:t>2018/9/24</a:t>
+              <a:t>2018/9/25</a:t>
             </a:fld>
             <a:endParaRPr lang="zh-TW" altLang="en-US"/>
           </a:p>
@@ -3592,7 +3592,7 @@
           <a:p>
             <a:fld id="{6992D42F-288A-499E-B279-D672B24F8207}" type="datetimeFigureOut">
               <a:rPr lang="zh-TW" altLang="en-US" smtClean="0"/>
-              <a:t>2018/9/24</a:t>
+              <a:t>2018/9/25</a:t>
             </a:fld>
             <a:endParaRPr lang="zh-TW" altLang="en-US"/>
           </a:p>
@@ -3858,7 +3858,7 @@
           <a:p>
             <a:fld id="{6992D42F-288A-499E-B279-D672B24F8207}" type="datetimeFigureOut">
               <a:rPr lang="zh-TW" altLang="en-US" smtClean="0"/>
-              <a:t>2018/9/24</a:t>
+              <a:t>2018/9/25</a:t>
             </a:fld>
             <a:endParaRPr lang="zh-TW" altLang="en-US"/>
           </a:p>
@@ -4232,7 +4232,7 @@
           <a:p>
             <a:fld id="{6992D42F-288A-499E-B279-D672B24F8207}" type="datetimeFigureOut">
               <a:rPr lang="zh-TW" altLang="en-US" smtClean="0"/>
-              <a:t>2018/9/24</a:t>
+              <a:t>2018/9/25</a:t>
             </a:fld>
             <a:endParaRPr lang="zh-TW" altLang="en-US"/>
           </a:p>
@@ -4380,7 +4380,7 @@
           <a:p>
             <a:fld id="{6992D42F-288A-499E-B279-D672B24F8207}" type="datetimeFigureOut">
               <a:rPr lang="zh-TW" altLang="en-US" smtClean="0"/>
-              <a:t>2018/9/24</a:t>
+              <a:t>2018/9/25</a:t>
             </a:fld>
             <a:endParaRPr lang="zh-TW" altLang="en-US"/>
           </a:p>
@@ -4505,7 +4505,7 @@
           <a:p>
             <a:fld id="{6992D42F-288A-499E-B279-D672B24F8207}" type="datetimeFigureOut">
               <a:rPr lang="zh-TW" altLang="en-US" smtClean="0"/>
-              <a:t>2018/9/24</a:t>
+              <a:t>2018/9/25</a:t>
             </a:fld>
             <a:endParaRPr lang="zh-TW" altLang="en-US"/>
           </a:p>
@@ -4790,7 +4790,7 @@
           <a:p>
             <a:fld id="{6992D42F-288A-499E-B279-D672B24F8207}" type="datetimeFigureOut">
               <a:rPr lang="zh-TW" altLang="en-US" smtClean="0"/>
-              <a:t>2018/9/24</a:t>
+              <a:t>2018/9/25</a:t>
             </a:fld>
             <a:endParaRPr lang="zh-TW" altLang="en-US"/>
           </a:p>
@@ -5114,7 +5114,7 @@
           <a:p>
             <a:fld id="{6992D42F-288A-499E-B279-D672B24F8207}" type="datetimeFigureOut">
               <a:rPr lang="zh-TW" altLang="en-US" smtClean="0"/>
-              <a:t>2018/9/24</a:t>
+              <a:t>2018/9/25</a:t>
             </a:fld>
             <a:endParaRPr lang="zh-TW" altLang="en-US"/>
           </a:p>
@@ -5328,7 +5328,7 @@
           <a:p>
             <a:fld id="{6992D42F-288A-499E-B279-D672B24F8207}" type="datetimeFigureOut">
               <a:rPr lang="zh-TW" altLang="en-US" smtClean="0"/>
-              <a:t>2018/9/24</a:t>
+              <a:t>2018/9/25</a:t>
             </a:fld>
             <a:endParaRPr lang="zh-TW" altLang="en-US"/>
           </a:p>
@@ -5974,36 +5974,466 @@
           </a:p>
         </p:txBody>
       </p:sp>
-      <p:pic>
-        <p:nvPicPr>
-          <p:cNvPr id="5" name="圖片 4"/>
-          <p:cNvPicPr>
-            <a:picLocks noChangeAspect="1"/>
-          </p:cNvPicPr>
+      <p:sp>
+        <p:nvSpPr>
+          <p:cNvPr id="6" name="矩形 5"/>
+          <p:cNvSpPr/>
           <p:nvPr/>
-        </p:nvPicPr>
-        <p:blipFill>
-          <a:blip r:embed="rId2">
-            <a:extLst>
-              <a:ext uri="{28A0092B-C50C-407E-A947-70E740481C1C}">
-                <a14:useLocalDpi xmlns:a14="http://schemas.microsoft.com/office/drawing/2010/main" val="0"/>
-              </a:ext>
-            </a:extLst>
-          </a:blip>
-          <a:stretch>
-            <a:fillRect/>
-          </a:stretch>
-        </p:blipFill>
+        </p:nvSpPr>
         <p:spPr>
           <a:xfrm>
-            <a:off x="8873720" y="1574760"/>
-            <a:ext cx="2552350" cy="4783745"/>
+            <a:off x="4721226" y="1842974"/>
+            <a:ext cx="6096000" cy="4247317"/>
           </a:xfrm>
           <a:prstGeom prst="rect">
             <a:avLst/>
           </a:prstGeom>
+          <a:solidFill>
+            <a:schemeClr val="tx1"/>
+          </a:solidFill>
         </p:spPr>
-      </p:pic>
+        <p:txBody>
+          <a:bodyPr>
+            <a:spAutoFit/>
+          </a:bodyPr>
+          <a:lstStyle/>
+          <a:p>
+            <a:r>
+              <a:rPr lang="en-US" altLang="zh-TW" dirty="0" smtClean="0">
+                <a:solidFill>
+                  <a:srgbClr val="000000"/>
+                </a:solidFill>
+                <a:latin typeface="細明體" panose="02020509000000000000" pitchFamily="49" charset="-120"/>
+                <a:ea typeface="細明體" panose="02020509000000000000" pitchFamily="49" charset="-120"/>
+              </a:rPr>
+              <a:t> </a:t>
+            </a:r>
+            <a:r>
+              <a:rPr lang="en-US" altLang="zh-TW" dirty="0" smtClean="0">
+                <a:solidFill>
+                  <a:srgbClr val="008000"/>
+                </a:solidFill>
+                <a:latin typeface="細明體" panose="02020509000000000000" pitchFamily="49" charset="-120"/>
+                <a:ea typeface="細明體" panose="02020509000000000000" pitchFamily="49" charset="-120"/>
+              </a:rPr>
+              <a:t>// sword</a:t>
+            </a:r>
+            <a:endParaRPr lang="en-US" altLang="zh-TW" dirty="0" smtClean="0">
+              <a:solidFill>
+                <a:srgbClr val="000000"/>
+              </a:solidFill>
+              <a:latin typeface="細明體" panose="02020509000000000000" pitchFamily="49" charset="-120"/>
+              <a:ea typeface="細明體" panose="02020509000000000000" pitchFamily="49" charset="-120"/>
+            </a:endParaRPr>
+          </a:p>
+          <a:p>
+            <a:r>
+              <a:rPr lang="en-US" altLang="zh-TW" dirty="0" smtClean="0">
+                <a:solidFill>
+                  <a:srgbClr val="000000"/>
+                </a:solidFill>
+                <a:latin typeface="細明體" panose="02020509000000000000" pitchFamily="49" charset="-120"/>
+                <a:ea typeface="細明體" panose="02020509000000000000" pitchFamily="49" charset="-120"/>
+              </a:rPr>
+              <a:t>                            </a:t>
+            </a:r>
+          </a:p>
+          <a:p>
+            <a:r>
+              <a:rPr lang="zh-TW" altLang="en-US" dirty="0" smtClean="0">
+                <a:solidFill>
+                  <a:srgbClr val="000000"/>
+                </a:solidFill>
+                <a:latin typeface="細明體" panose="02020509000000000000" pitchFamily="49" charset="-120"/>
+                <a:ea typeface="細明體" panose="02020509000000000000" pitchFamily="49" charset="-120"/>
+              </a:rPr>
+              <a:t>                            </a:t>
+            </a:r>
+            <a:r>
+              <a:rPr lang="en-US" altLang="zh-TW" dirty="0" smtClean="0">
+                <a:solidFill>
+                  <a:srgbClr val="000000"/>
+                </a:solidFill>
+                <a:latin typeface="細明體" panose="02020509000000000000" pitchFamily="49" charset="-120"/>
+                <a:ea typeface="細明體" panose="02020509000000000000" pitchFamily="49" charset="-120"/>
+              </a:rPr>
+              <a:t>{</a:t>
+            </a:r>
+          </a:p>
+          <a:p>
+            <a:r>
+              <a:rPr lang="zh-TW" altLang="en-US" dirty="0" smtClean="0">
+                <a:solidFill>
+                  <a:srgbClr val="000000"/>
+                </a:solidFill>
+                <a:latin typeface="細明體" panose="02020509000000000000" pitchFamily="49" charset="-120"/>
+                <a:ea typeface="細明體" panose="02020509000000000000" pitchFamily="49" charset="-120"/>
+              </a:rPr>
+              <a:t>                                </a:t>
+            </a:r>
+            <a:r>
+              <a:rPr lang="en-US" altLang="zh-TW" dirty="0" smtClean="0">
+                <a:solidFill>
+                  <a:srgbClr val="A31515"/>
+                </a:solidFill>
+                <a:latin typeface="細明體" panose="02020509000000000000" pitchFamily="49" charset="-120"/>
+                <a:ea typeface="細明體" panose="02020509000000000000" pitchFamily="49" charset="-120"/>
+              </a:rPr>
+              <a:t>"     *     "</a:t>
+            </a:r>
+            <a:r>
+              <a:rPr lang="en-US" altLang="zh-TW" dirty="0" smtClean="0">
+                <a:solidFill>
+                  <a:srgbClr val="000000"/>
+                </a:solidFill>
+                <a:latin typeface="細明體" panose="02020509000000000000" pitchFamily="49" charset="-120"/>
+                <a:ea typeface="細明體" panose="02020509000000000000" pitchFamily="49" charset="-120"/>
+              </a:rPr>
+              <a:t>,</a:t>
+            </a:r>
+          </a:p>
+          <a:p>
+            <a:r>
+              <a:rPr lang="zh-TW" altLang="en-US" dirty="0" smtClean="0">
+                <a:solidFill>
+                  <a:srgbClr val="000000"/>
+                </a:solidFill>
+                <a:latin typeface="細明體" panose="02020509000000000000" pitchFamily="49" charset="-120"/>
+                <a:ea typeface="細明體" panose="02020509000000000000" pitchFamily="49" charset="-120"/>
+              </a:rPr>
+              <a:t>                                </a:t>
+            </a:r>
+            <a:r>
+              <a:rPr lang="en-US" altLang="zh-TW" dirty="0" smtClean="0">
+                <a:solidFill>
+                  <a:srgbClr val="A31515"/>
+                </a:solidFill>
+                <a:latin typeface="細明體" panose="02020509000000000000" pitchFamily="49" charset="-120"/>
+                <a:ea typeface="細明體" panose="02020509000000000000" pitchFamily="49" charset="-120"/>
+              </a:rPr>
+              <a:t>"   *   *   "</a:t>
+            </a:r>
+            <a:r>
+              <a:rPr lang="en-US" altLang="zh-TW" dirty="0" smtClean="0">
+                <a:solidFill>
+                  <a:srgbClr val="000000"/>
+                </a:solidFill>
+                <a:latin typeface="細明體" panose="02020509000000000000" pitchFamily="49" charset="-120"/>
+                <a:ea typeface="細明體" panose="02020509000000000000" pitchFamily="49" charset="-120"/>
+              </a:rPr>
+              <a:t>,</a:t>
+            </a:r>
+          </a:p>
+          <a:p>
+            <a:r>
+              <a:rPr lang="zh-TW" altLang="en-US" dirty="0" smtClean="0">
+                <a:solidFill>
+                  <a:srgbClr val="000000"/>
+                </a:solidFill>
+                <a:latin typeface="細明體" panose="02020509000000000000" pitchFamily="49" charset="-120"/>
+                <a:ea typeface="細明體" panose="02020509000000000000" pitchFamily="49" charset="-120"/>
+              </a:rPr>
+              <a:t>                                </a:t>
+            </a:r>
+            <a:r>
+              <a:rPr lang="en-US" altLang="zh-TW" dirty="0" smtClean="0">
+                <a:solidFill>
+                  <a:srgbClr val="A31515"/>
+                </a:solidFill>
+                <a:latin typeface="細明體" panose="02020509000000000000" pitchFamily="49" charset="-120"/>
+                <a:ea typeface="細明體" panose="02020509000000000000" pitchFamily="49" charset="-120"/>
+              </a:rPr>
+              <a:t>"   *   *   "</a:t>
+            </a:r>
+            <a:r>
+              <a:rPr lang="en-US" altLang="zh-TW" dirty="0" smtClean="0">
+                <a:solidFill>
+                  <a:srgbClr val="000000"/>
+                </a:solidFill>
+                <a:latin typeface="細明體" panose="02020509000000000000" pitchFamily="49" charset="-120"/>
+                <a:ea typeface="細明體" panose="02020509000000000000" pitchFamily="49" charset="-120"/>
+              </a:rPr>
+              <a:t>,</a:t>
+            </a:r>
+          </a:p>
+          <a:p>
+            <a:r>
+              <a:rPr lang="zh-TW" altLang="en-US" dirty="0" smtClean="0">
+                <a:solidFill>
+                  <a:srgbClr val="000000"/>
+                </a:solidFill>
+                <a:latin typeface="細明體" panose="02020509000000000000" pitchFamily="49" charset="-120"/>
+                <a:ea typeface="細明體" panose="02020509000000000000" pitchFamily="49" charset="-120"/>
+              </a:rPr>
+              <a:t>                                </a:t>
+            </a:r>
+            <a:r>
+              <a:rPr lang="en-US" altLang="zh-TW" dirty="0" smtClean="0">
+                <a:solidFill>
+                  <a:srgbClr val="A31515"/>
+                </a:solidFill>
+                <a:latin typeface="細明體" panose="02020509000000000000" pitchFamily="49" charset="-120"/>
+                <a:ea typeface="細明體" panose="02020509000000000000" pitchFamily="49" charset="-120"/>
+              </a:rPr>
+              <a:t>"   *   *   "</a:t>
+            </a:r>
+            <a:r>
+              <a:rPr lang="en-US" altLang="zh-TW" dirty="0" smtClean="0">
+                <a:solidFill>
+                  <a:srgbClr val="000000"/>
+                </a:solidFill>
+                <a:latin typeface="細明體" panose="02020509000000000000" pitchFamily="49" charset="-120"/>
+                <a:ea typeface="細明體" panose="02020509000000000000" pitchFamily="49" charset="-120"/>
+              </a:rPr>
+              <a:t>,</a:t>
+            </a:r>
+          </a:p>
+          <a:p>
+            <a:r>
+              <a:rPr lang="zh-TW" altLang="en-US" dirty="0" smtClean="0">
+                <a:solidFill>
+                  <a:srgbClr val="000000"/>
+                </a:solidFill>
+                <a:latin typeface="細明體" panose="02020509000000000000" pitchFamily="49" charset="-120"/>
+                <a:ea typeface="細明體" panose="02020509000000000000" pitchFamily="49" charset="-120"/>
+              </a:rPr>
+              <a:t>                                </a:t>
+            </a:r>
+            <a:r>
+              <a:rPr lang="en-US" altLang="zh-TW" dirty="0" smtClean="0">
+                <a:solidFill>
+                  <a:srgbClr val="A31515"/>
+                </a:solidFill>
+                <a:latin typeface="細明體" panose="02020509000000000000" pitchFamily="49" charset="-120"/>
+                <a:ea typeface="細明體" panose="02020509000000000000" pitchFamily="49" charset="-120"/>
+              </a:rPr>
+              <a:t>"   *   *   "</a:t>
+            </a:r>
+            <a:r>
+              <a:rPr lang="en-US" altLang="zh-TW" dirty="0" smtClean="0">
+                <a:solidFill>
+                  <a:srgbClr val="000000"/>
+                </a:solidFill>
+                <a:latin typeface="細明體" panose="02020509000000000000" pitchFamily="49" charset="-120"/>
+                <a:ea typeface="細明體" panose="02020509000000000000" pitchFamily="49" charset="-120"/>
+              </a:rPr>
+              <a:t>,</a:t>
+            </a:r>
+          </a:p>
+          <a:p>
+            <a:r>
+              <a:rPr lang="zh-TW" altLang="en-US" dirty="0" smtClean="0">
+                <a:solidFill>
+                  <a:srgbClr val="000000"/>
+                </a:solidFill>
+                <a:latin typeface="細明體" panose="02020509000000000000" pitchFamily="49" charset="-120"/>
+                <a:ea typeface="細明體" panose="02020509000000000000" pitchFamily="49" charset="-120"/>
+              </a:rPr>
+              <a:t>                                </a:t>
+            </a:r>
+            <a:r>
+              <a:rPr lang="en-US" altLang="zh-TW" dirty="0" smtClean="0">
+                <a:solidFill>
+                  <a:srgbClr val="A31515"/>
+                </a:solidFill>
+                <a:latin typeface="細明體" panose="02020509000000000000" pitchFamily="49" charset="-120"/>
+                <a:ea typeface="細明體" panose="02020509000000000000" pitchFamily="49" charset="-120"/>
+              </a:rPr>
+              <a:t>"   *   *   "</a:t>
+            </a:r>
+            <a:r>
+              <a:rPr lang="en-US" altLang="zh-TW" dirty="0" smtClean="0">
+                <a:solidFill>
+                  <a:srgbClr val="000000"/>
+                </a:solidFill>
+                <a:latin typeface="細明體" panose="02020509000000000000" pitchFamily="49" charset="-120"/>
+                <a:ea typeface="細明體" panose="02020509000000000000" pitchFamily="49" charset="-120"/>
+              </a:rPr>
+              <a:t>,</a:t>
+            </a:r>
+          </a:p>
+          <a:p>
+            <a:r>
+              <a:rPr lang="zh-TW" altLang="en-US" dirty="0" smtClean="0">
+                <a:solidFill>
+                  <a:srgbClr val="000000"/>
+                </a:solidFill>
+                <a:latin typeface="細明體" panose="02020509000000000000" pitchFamily="49" charset="-120"/>
+                <a:ea typeface="細明體" panose="02020509000000000000" pitchFamily="49" charset="-120"/>
+              </a:rPr>
+              <a:t>                                </a:t>
+            </a:r>
+            <a:r>
+              <a:rPr lang="en-US" altLang="zh-TW" dirty="0" smtClean="0">
+                <a:solidFill>
+                  <a:srgbClr val="A31515"/>
+                </a:solidFill>
+                <a:latin typeface="細明體" panose="02020509000000000000" pitchFamily="49" charset="-120"/>
+                <a:ea typeface="細明體" panose="02020509000000000000" pitchFamily="49" charset="-120"/>
+              </a:rPr>
+              <a:t>" ********* "</a:t>
+            </a:r>
+            <a:r>
+              <a:rPr lang="en-US" altLang="zh-TW" dirty="0" smtClean="0">
+                <a:solidFill>
+                  <a:srgbClr val="000000"/>
+                </a:solidFill>
+                <a:latin typeface="細明體" panose="02020509000000000000" pitchFamily="49" charset="-120"/>
+                <a:ea typeface="細明體" panose="02020509000000000000" pitchFamily="49" charset="-120"/>
+              </a:rPr>
+              <a:t>,</a:t>
+            </a:r>
+          </a:p>
+          <a:p>
+            <a:r>
+              <a:rPr lang="zh-TW" altLang="en-US" dirty="0" smtClean="0">
+                <a:solidFill>
+                  <a:srgbClr val="000000"/>
+                </a:solidFill>
+                <a:latin typeface="細明體" panose="02020509000000000000" pitchFamily="49" charset="-120"/>
+                <a:ea typeface="細明體" panose="02020509000000000000" pitchFamily="49" charset="-120"/>
+              </a:rPr>
+              <a:t>                                </a:t>
+            </a:r>
+            <a:r>
+              <a:rPr lang="en-US" altLang="zh-TW" dirty="0" smtClean="0">
+                <a:solidFill>
+                  <a:srgbClr val="A31515"/>
+                </a:solidFill>
+                <a:latin typeface="細明體" panose="02020509000000000000" pitchFamily="49" charset="-120"/>
+                <a:ea typeface="細明體" panose="02020509000000000000" pitchFamily="49" charset="-120"/>
+              </a:rPr>
+              <a:t>" ********* "</a:t>
+            </a:r>
+            <a:r>
+              <a:rPr lang="en-US" altLang="zh-TW" dirty="0" smtClean="0">
+                <a:solidFill>
+                  <a:srgbClr val="000000"/>
+                </a:solidFill>
+                <a:latin typeface="細明體" panose="02020509000000000000" pitchFamily="49" charset="-120"/>
+                <a:ea typeface="細明體" panose="02020509000000000000" pitchFamily="49" charset="-120"/>
+              </a:rPr>
+              <a:t>,</a:t>
+            </a:r>
+          </a:p>
+          <a:p>
+            <a:r>
+              <a:rPr lang="zh-TW" altLang="en-US" dirty="0" smtClean="0">
+                <a:solidFill>
+                  <a:srgbClr val="000000"/>
+                </a:solidFill>
+                <a:latin typeface="細明體" panose="02020509000000000000" pitchFamily="49" charset="-120"/>
+                <a:ea typeface="細明體" panose="02020509000000000000" pitchFamily="49" charset="-120"/>
+              </a:rPr>
+              <a:t>                                </a:t>
+            </a:r>
+            <a:r>
+              <a:rPr lang="en-US" altLang="zh-TW" dirty="0" smtClean="0">
+                <a:solidFill>
+                  <a:srgbClr val="A31515"/>
+                </a:solidFill>
+                <a:latin typeface="細明體" panose="02020509000000000000" pitchFamily="49" charset="-120"/>
+                <a:ea typeface="細明體" panose="02020509000000000000" pitchFamily="49" charset="-120"/>
+              </a:rPr>
+              <a:t>"    ***    "</a:t>
+            </a:r>
+            <a:r>
+              <a:rPr lang="en-US" altLang="zh-TW" dirty="0" smtClean="0">
+                <a:solidFill>
+                  <a:srgbClr val="000000"/>
+                </a:solidFill>
+                <a:latin typeface="細明體" panose="02020509000000000000" pitchFamily="49" charset="-120"/>
+                <a:ea typeface="細明體" panose="02020509000000000000" pitchFamily="49" charset="-120"/>
+              </a:rPr>
+              <a:t>,</a:t>
+            </a:r>
+          </a:p>
+          <a:p>
+            <a:r>
+              <a:rPr lang="zh-TW" altLang="en-US" dirty="0" smtClean="0">
+                <a:solidFill>
+                  <a:srgbClr val="000000"/>
+                </a:solidFill>
+                <a:latin typeface="細明體" panose="02020509000000000000" pitchFamily="49" charset="-120"/>
+                <a:ea typeface="細明體" panose="02020509000000000000" pitchFamily="49" charset="-120"/>
+              </a:rPr>
+              <a:t>                                </a:t>
+            </a:r>
+            <a:r>
+              <a:rPr lang="en-US" altLang="zh-TW" dirty="0" smtClean="0">
+                <a:solidFill>
+                  <a:srgbClr val="A31515"/>
+                </a:solidFill>
+                <a:latin typeface="細明體" panose="02020509000000000000" pitchFamily="49" charset="-120"/>
+                <a:ea typeface="細明體" panose="02020509000000000000" pitchFamily="49" charset="-120"/>
+              </a:rPr>
+              <a:t>"    ***    "</a:t>
+            </a:r>
+            <a:r>
+              <a:rPr lang="en-US" altLang="zh-TW" dirty="0" smtClean="0">
+                <a:solidFill>
+                  <a:srgbClr val="000000"/>
+                </a:solidFill>
+                <a:latin typeface="細明體" panose="02020509000000000000" pitchFamily="49" charset="-120"/>
+                <a:ea typeface="細明體" panose="02020509000000000000" pitchFamily="49" charset="-120"/>
+              </a:rPr>
+              <a:t>,</a:t>
+            </a:r>
+          </a:p>
+          <a:p>
+            <a:r>
+              <a:rPr lang="zh-TW" altLang="en-US" dirty="0" smtClean="0">
+                <a:solidFill>
+                  <a:srgbClr val="000000"/>
+                </a:solidFill>
+                <a:latin typeface="細明體" panose="02020509000000000000" pitchFamily="49" charset="-120"/>
+                <a:ea typeface="細明體" panose="02020509000000000000" pitchFamily="49" charset="-120"/>
+              </a:rPr>
+              <a:t>                                </a:t>
+            </a:r>
+            <a:r>
+              <a:rPr lang="en-US" altLang="zh-TW" dirty="0" smtClean="0">
+                <a:solidFill>
+                  <a:srgbClr val="A31515"/>
+                </a:solidFill>
+                <a:latin typeface="細明體" panose="02020509000000000000" pitchFamily="49" charset="-120"/>
+                <a:ea typeface="細明體" panose="02020509000000000000" pitchFamily="49" charset="-120"/>
+              </a:rPr>
+              <a:t>"           "</a:t>
+            </a:r>
+            <a:endParaRPr lang="zh-TW" altLang="en-US" dirty="0" smtClean="0">
+              <a:solidFill>
+                <a:srgbClr val="000000"/>
+              </a:solidFill>
+              <a:latin typeface="細明體" panose="02020509000000000000" pitchFamily="49" charset="-120"/>
+              <a:ea typeface="細明體" panose="02020509000000000000" pitchFamily="49" charset="-120"/>
+            </a:endParaRPr>
+          </a:p>
+          <a:p>
+            <a:r>
+              <a:rPr lang="zh-TW" altLang="en-US" dirty="0" smtClean="0">
+                <a:solidFill>
+                  <a:srgbClr val="000000"/>
+                </a:solidFill>
+                <a:latin typeface="細明體" panose="02020509000000000000" pitchFamily="49" charset="-120"/>
+                <a:ea typeface="細明體" panose="02020509000000000000" pitchFamily="49" charset="-120"/>
+              </a:rPr>
+              <a:t>                            </a:t>
+            </a:r>
+            <a:r>
+              <a:rPr lang="en-US" altLang="zh-TW" dirty="0" smtClean="0">
+                <a:solidFill>
+                  <a:srgbClr val="000000"/>
+                </a:solidFill>
+                <a:latin typeface="細明體" panose="02020509000000000000" pitchFamily="49" charset="-120"/>
+                <a:ea typeface="細明體" panose="02020509000000000000" pitchFamily="49" charset="-120"/>
+              </a:rPr>
+              <a:t>};</a:t>
+            </a:r>
+            <a:endParaRPr lang="zh-TW" altLang="en-US" dirty="0"/>
+          </a:p>
+        </p:txBody>
+      </p:sp>
     </p:spTree>
     <p:extLst>
       <p:ext uri="{BB962C8B-B14F-4D97-AF65-F5344CB8AC3E}">
@@ -6091,36 +6521,497 @@
           </a:p>
         </p:txBody>
       </p:sp>
-      <p:pic>
-        <p:nvPicPr>
-          <p:cNvPr id="5" name="圖片 4"/>
-          <p:cNvPicPr>
-            <a:picLocks noChangeAspect="1"/>
-          </p:cNvPicPr>
+      <p:sp>
+        <p:nvSpPr>
+          <p:cNvPr id="6" name="矩形 5"/>
+          <p:cNvSpPr/>
           <p:nvPr/>
-        </p:nvPicPr>
-        <p:blipFill>
-          <a:blip r:embed="rId2">
-            <a:extLst>
-              <a:ext uri="{28A0092B-C50C-407E-A947-70E740481C1C}">
-                <a14:useLocalDpi xmlns:a14="http://schemas.microsoft.com/office/drawing/2010/main" val="0"/>
-              </a:ext>
-            </a:extLst>
-          </a:blip>
-          <a:stretch>
-            <a:fillRect/>
-          </a:stretch>
-        </p:blipFill>
+        </p:nvSpPr>
         <p:spPr>
           <a:xfrm>
-            <a:off x="8873720" y="1560351"/>
-            <a:ext cx="2552350" cy="4812562"/>
+            <a:off x="4721226" y="1981474"/>
+            <a:ext cx="6096000" cy="3970318"/>
           </a:xfrm>
           <a:prstGeom prst="rect">
             <a:avLst/>
           </a:prstGeom>
+          <a:solidFill>
+            <a:schemeClr val="tx1"/>
+          </a:solidFill>
         </p:spPr>
-      </p:pic>
+        <p:txBody>
+          <a:bodyPr>
+            <a:spAutoFit/>
+          </a:bodyPr>
+          <a:lstStyle/>
+          <a:p>
+            <a:r>
+              <a:rPr lang="en-US" altLang="zh-TW" dirty="0" smtClean="0">
+                <a:solidFill>
+                  <a:srgbClr val="000000"/>
+                </a:solidFill>
+                <a:latin typeface="細明體" panose="02020509000000000000" pitchFamily="49" charset="-120"/>
+                <a:ea typeface="細明體" panose="02020509000000000000" pitchFamily="49" charset="-120"/>
+              </a:rPr>
+              <a:t> </a:t>
+            </a:r>
+            <a:r>
+              <a:rPr lang="en-US" altLang="zh-TW" dirty="0" smtClean="0">
+                <a:solidFill>
+                  <a:srgbClr val="008000"/>
+                </a:solidFill>
+                <a:latin typeface="細明體" panose="02020509000000000000" pitchFamily="49" charset="-120"/>
+                <a:ea typeface="細明體" panose="02020509000000000000" pitchFamily="49" charset="-120"/>
+              </a:rPr>
+              <a:t>// hammer</a:t>
+            </a:r>
+            <a:endParaRPr lang="en-US" altLang="zh-TW" dirty="0" smtClean="0">
+              <a:solidFill>
+                <a:srgbClr val="000000"/>
+              </a:solidFill>
+              <a:latin typeface="細明體" panose="02020509000000000000" pitchFamily="49" charset="-120"/>
+              <a:ea typeface="細明體" panose="02020509000000000000" pitchFamily="49" charset="-120"/>
+            </a:endParaRPr>
+          </a:p>
+          <a:p>
+            <a:r>
+              <a:rPr lang="en-US" altLang="zh-TW" dirty="0" smtClean="0">
+                <a:solidFill>
+                  <a:srgbClr val="000000"/>
+                </a:solidFill>
+                <a:latin typeface="細明體" panose="02020509000000000000" pitchFamily="49" charset="-120"/>
+                <a:ea typeface="細明體" panose="02020509000000000000" pitchFamily="49" charset="-120"/>
+              </a:rPr>
+              <a:t>                            </a:t>
+            </a:r>
+            <a:r>
+              <a:rPr lang="en-US" altLang="zh-TW" dirty="0" err="1" smtClean="0">
+                <a:solidFill>
+                  <a:srgbClr val="000000"/>
+                </a:solidFill>
+                <a:latin typeface="細明體" panose="02020509000000000000" pitchFamily="49" charset="-120"/>
+                <a:ea typeface="細明體" panose="02020509000000000000" pitchFamily="49" charset="-120"/>
+              </a:rPr>
+              <a:t>img</a:t>
+            </a:r>
+            <a:r>
+              <a:rPr lang="en-US" altLang="zh-TW" dirty="0" smtClean="0">
+                <a:solidFill>
+                  <a:srgbClr val="000000"/>
+                </a:solidFill>
+                <a:latin typeface="細明體" panose="02020509000000000000" pitchFamily="49" charset="-120"/>
+                <a:ea typeface="細明體" panose="02020509000000000000" pitchFamily="49" charset="-120"/>
+              </a:rPr>
+              <a:t> = </a:t>
+            </a:r>
+            <a:r>
+              <a:rPr lang="en-US" altLang="zh-TW" dirty="0" smtClean="0">
+                <a:solidFill>
+                  <a:srgbClr val="0000FF"/>
+                </a:solidFill>
+                <a:latin typeface="細明體" panose="02020509000000000000" pitchFamily="49" charset="-120"/>
+                <a:ea typeface="細明體" panose="02020509000000000000" pitchFamily="49" charset="-120"/>
+              </a:rPr>
+              <a:t>new</a:t>
+            </a:r>
+            <a:r>
+              <a:rPr lang="en-US" altLang="zh-TW" dirty="0" smtClean="0">
+                <a:solidFill>
+                  <a:srgbClr val="000000"/>
+                </a:solidFill>
+                <a:latin typeface="細明體" panose="02020509000000000000" pitchFamily="49" charset="-120"/>
+                <a:ea typeface="細明體" panose="02020509000000000000" pitchFamily="49" charset="-120"/>
+              </a:rPr>
+              <a:t> </a:t>
+            </a:r>
+            <a:r>
+              <a:rPr lang="en-US" altLang="zh-TW" dirty="0" smtClean="0">
+                <a:solidFill>
+                  <a:srgbClr val="0000FF"/>
+                </a:solidFill>
+                <a:latin typeface="細明體" panose="02020509000000000000" pitchFamily="49" charset="-120"/>
+                <a:ea typeface="細明體" panose="02020509000000000000" pitchFamily="49" charset="-120"/>
+              </a:rPr>
+              <a:t>string</a:t>
+            </a:r>
+            <a:r>
+              <a:rPr lang="en-US" altLang="zh-TW" dirty="0" smtClean="0">
+                <a:solidFill>
+                  <a:srgbClr val="000000"/>
+                </a:solidFill>
+                <a:latin typeface="細明體" panose="02020509000000000000" pitchFamily="49" charset="-120"/>
+                <a:ea typeface="細明體" panose="02020509000000000000" pitchFamily="49" charset="-120"/>
+              </a:rPr>
+              <a:t>[]</a:t>
+            </a:r>
+          </a:p>
+          <a:p>
+            <a:r>
+              <a:rPr lang="zh-TW" altLang="en-US" dirty="0" smtClean="0">
+                <a:solidFill>
+                  <a:srgbClr val="000000"/>
+                </a:solidFill>
+                <a:latin typeface="細明體" panose="02020509000000000000" pitchFamily="49" charset="-120"/>
+                <a:ea typeface="細明體" panose="02020509000000000000" pitchFamily="49" charset="-120"/>
+              </a:rPr>
+              <a:t>                            </a:t>
+            </a:r>
+            <a:r>
+              <a:rPr lang="en-US" altLang="zh-TW" dirty="0" smtClean="0">
+                <a:solidFill>
+                  <a:srgbClr val="000000"/>
+                </a:solidFill>
+                <a:latin typeface="細明體" panose="02020509000000000000" pitchFamily="49" charset="-120"/>
+                <a:ea typeface="細明體" panose="02020509000000000000" pitchFamily="49" charset="-120"/>
+              </a:rPr>
+              <a:t>{</a:t>
+            </a:r>
+          </a:p>
+          <a:p>
+            <a:r>
+              <a:rPr lang="zh-TW" altLang="en-US" dirty="0" smtClean="0">
+                <a:solidFill>
+                  <a:srgbClr val="000000"/>
+                </a:solidFill>
+                <a:latin typeface="細明體" panose="02020509000000000000" pitchFamily="49" charset="-120"/>
+                <a:ea typeface="細明體" panose="02020509000000000000" pitchFamily="49" charset="-120"/>
+              </a:rPr>
+              <a:t>                                </a:t>
+            </a:r>
+            <a:r>
+              <a:rPr lang="en-US" altLang="zh-TW" dirty="0" smtClean="0">
+                <a:solidFill>
+                  <a:srgbClr val="A31515"/>
+                </a:solidFill>
+                <a:latin typeface="細明體" panose="02020509000000000000" pitchFamily="49" charset="-120"/>
+                <a:ea typeface="細明體" panose="02020509000000000000" pitchFamily="49" charset="-120"/>
+              </a:rPr>
+              <a:t>"***********"</a:t>
+            </a:r>
+            <a:r>
+              <a:rPr lang="en-US" altLang="zh-TW" dirty="0" smtClean="0">
+                <a:solidFill>
+                  <a:srgbClr val="000000"/>
+                </a:solidFill>
+                <a:latin typeface="細明體" panose="02020509000000000000" pitchFamily="49" charset="-120"/>
+                <a:ea typeface="細明體" panose="02020509000000000000" pitchFamily="49" charset="-120"/>
+              </a:rPr>
+              <a:t>,</a:t>
+            </a:r>
+          </a:p>
+          <a:p>
+            <a:r>
+              <a:rPr lang="zh-TW" altLang="en-US" dirty="0" smtClean="0">
+                <a:solidFill>
+                  <a:srgbClr val="000000"/>
+                </a:solidFill>
+                <a:latin typeface="細明體" panose="02020509000000000000" pitchFamily="49" charset="-120"/>
+                <a:ea typeface="細明體" panose="02020509000000000000" pitchFamily="49" charset="-120"/>
+              </a:rPr>
+              <a:t>                                </a:t>
+            </a:r>
+            <a:r>
+              <a:rPr lang="en-US" altLang="zh-TW" dirty="0" smtClean="0">
+                <a:solidFill>
+                  <a:srgbClr val="A31515"/>
+                </a:solidFill>
+                <a:latin typeface="細明體" panose="02020509000000000000" pitchFamily="49" charset="-120"/>
+                <a:ea typeface="細明體" panose="02020509000000000000" pitchFamily="49" charset="-120"/>
+              </a:rPr>
+              <a:t>"***********"</a:t>
+            </a:r>
+            <a:r>
+              <a:rPr lang="en-US" altLang="zh-TW" dirty="0" smtClean="0">
+                <a:solidFill>
+                  <a:srgbClr val="000000"/>
+                </a:solidFill>
+                <a:latin typeface="細明體" panose="02020509000000000000" pitchFamily="49" charset="-120"/>
+                <a:ea typeface="細明體" panose="02020509000000000000" pitchFamily="49" charset="-120"/>
+              </a:rPr>
+              <a:t>,</a:t>
+            </a:r>
+          </a:p>
+          <a:p>
+            <a:r>
+              <a:rPr lang="zh-TW" altLang="en-US" dirty="0" smtClean="0">
+                <a:solidFill>
+                  <a:srgbClr val="000000"/>
+                </a:solidFill>
+                <a:latin typeface="細明體" panose="02020509000000000000" pitchFamily="49" charset="-120"/>
+                <a:ea typeface="細明體" panose="02020509000000000000" pitchFamily="49" charset="-120"/>
+              </a:rPr>
+              <a:t>                                </a:t>
+            </a:r>
+            <a:r>
+              <a:rPr lang="en-US" altLang="zh-TW" dirty="0" smtClean="0">
+                <a:solidFill>
+                  <a:srgbClr val="A31515"/>
+                </a:solidFill>
+                <a:latin typeface="細明體" panose="02020509000000000000" pitchFamily="49" charset="-120"/>
+                <a:ea typeface="細明體" panose="02020509000000000000" pitchFamily="49" charset="-120"/>
+              </a:rPr>
+              <a:t>"***********"</a:t>
+            </a:r>
+            <a:r>
+              <a:rPr lang="en-US" altLang="zh-TW" dirty="0" smtClean="0">
+                <a:solidFill>
+                  <a:srgbClr val="000000"/>
+                </a:solidFill>
+                <a:latin typeface="細明體" panose="02020509000000000000" pitchFamily="49" charset="-120"/>
+                <a:ea typeface="細明體" panose="02020509000000000000" pitchFamily="49" charset="-120"/>
+              </a:rPr>
+              <a:t>,</a:t>
+            </a:r>
+          </a:p>
+          <a:p>
+            <a:r>
+              <a:rPr lang="zh-TW" altLang="en-US" dirty="0" smtClean="0">
+                <a:solidFill>
+                  <a:srgbClr val="000000"/>
+                </a:solidFill>
+                <a:latin typeface="細明體" panose="02020509000000000000" pitchFamily="49" charset="-120"/>
+                <a:ea typeface="細明體" panose="02020509000000000000" pitchFamily="49" charset="-120"/>
+              </a:rPr>
+              <a:t>                                </a:t>
+            </a:r>
+            <a:r>
+              <a:rPr lang="en-US" altLang="zh-TW" dirty="0" smtClean="0">
+                <a:solidFill>
+                  <a:srgbClr val="A31515"/>
+                </a:solidFill>
+                <a:latin typeface="細明體" panose="02020509000000000000" pitchFamily="49" charset="-120"/>
+                <a:ea typeface="細明體" panose="02020509000000000000" pitchFamily="49" charset="-120"/>
+              </a:rPr>
+              <a:t>"    ***    "</a:t>
+            </a:r>
+            <a:r>
+              <a:rPr lang="en-US" altLang="zh-TW" dirty="0" smtClean="0">
+                <a:solidFill>
+                  <a:srgbClr val="000000"/>
+                </a:solidFill>
+                <a:latin typeface="細明體" panose="02020509000000000000" pitchFamily="49" charset="-120"/>
+                <a:ea typeface="細明體" panose="02020509000000000000" pitchFamily="49" charset="-120"/>
+              </a:rPr>
+              <a:t>,</a:t>
+            </a:r>
+          </a:p>
+          <a:p>
+            <a:r>
+              <a:rPr lang="zh-TW" altLang="en-US" dirty="0" smtClean="0">
+                <a:solidFill>
+                  <a:srgbClr val="000000"/>
+                </a:solidFill>
+                <a:latin typeface="細明體" panose="02020509000000000000" pitchFamily="49" charset="-120"/>
+                <a:ea typeface="細明體" panose="02020509000000000000" pitchFamily="49" charset="-120"/>
+              </a:rPr>
+              <a:t>                                </a:t>
+            </a:r>
+            <a:r>
+              <a:rPr lang="en-US" altLang="zh-TW" dirty="0" smtClean="0">
+                <a:solidFill>
+                  <a:srgbClr val="A31515"/>
+                </a:solidFill>
+                <a:latin typeface="細明體" panose="02020509000000000000" pitchFamily="49" charset="-120"/>
+                <a:ea typeface="細明體" panose="02020509000000000000" pitchFamily="49" charset="-120"/>
+              </a:rPr>
+              <a:t>"    ***    "</a:t>
+            </a:r>
+            <a:r>
+              <a:rPr lang="en-US" altLang="zh-TW" dirty="0" smtClean="0">
+                <a:solidFill>
+                  <a:srgbClr val="000000"/>
+                </a:solidFill>
+                <a:latin typeface="細明體" panose="02020509000000000000" pitchFamily="49" charset="-120"/>
+                <a:ea typeface="細明體" panose="02020509000000000000" pitchFamily="49" charset="-120"/>
+              </a:rPr>
+              <a:t>,</a:t>
+            </a:r>
+          </a:p>
+          <a:p>
+            <a:r>
+              <a:rPr lang="zh-TW" altLang="en-US" dirty="0" smtClean="0">
+                <a:solidFill>
+                  <a:srgbClr val="000000"/>
+                </a:solidFill>
+                <a:latin typeface="細明體" panose="02020509000000000000" pitchFamily="49" charset="-120"/>
+                <a:ea typeface="細明體" panose="02020509000000000000" pitchFamily="49" charset="-120"/>
+              </a:rPr>
+              <a:t>                                </a:t>
+            </a:r>
+            <a:r>
+              <a:rPr lang="en-US" altLang="zh-TW" dirty="0" smtClean="0">
+                <a:solidFill>
+                  <a:srgbClr val="A31515"/>
+                </a:solidFill>
+                <a:latin typeface="細明體" panose="02020509000000000000" pitchFamily="49" charset="-120"/>
+                <a:ea typeface="細明體" panose="02020509000000000000" pitchFamily="49" charset="-120"/>
+              </a:rPr>
+              <a:t>"    ***    "</a:t>
+            </a:r>
+            <a:r>
+              <a:rPr lang="en-US" altLang="zh-TW" dirty="0" smtClean="0">
+                <a:solidFill>
+                  <a:srgbClr val="000000"/>
+                </a:solidFill>
+                <a:latin typeface="細明體" panose="02020509000000000000" pitchFamily="49" charset="-120"/>
+                <a:ea typeface="細明體" panose="02020509000000000000" pitchFamily="49" charset="-120"/>
+              </a:rPr>
+              <a:t>,</a:t>
+            </a:r>
+          </a:p>
+          <a:p>
+            <a:r>
+              <a:rPr lang="zh-TW" altLang="en-US" dirty="0" smtClean="0">
+                <a:solidFill>
+                  <a:srgbClr val="000000"/>
+                </a:solidFill>
+                <a:latin typeface="細明體" panose="02020509000000000000" pitchFamily="49" charset="-120"/>
+                <a:ea typeface="細明體" panose="02020509000000000000" pitchFamily="49" charset="-120"/>
+              </a:rPr>
+              <a:t>                                </a:t>
+            </a:r>
+            <a:r>
+              <a:rPr lang="en-US" altLang="zh-TW" dirty="0" smtClean="0">
+                <a:solidFill>
+                  <a:srgbClr val="A31515"/>
+                </a:solidFill>
+                <a:latin typeface="細明體" panose="02020509000000000000" pitchFamily="49" charset="-120"/>
+                <a:ea typeface="細明體" panose="02020509000000000000" pitchFamily="49" charset="-120"/>
+              </a:rPr>
+              <a:t>"    ***    "</a:t>
+            </a:r>
+            <a:r>
+              <a:rPr lang="en-US" altLang="zh-TW" dirty="0" smtClean="0">
+                <a:solidFill>
+                  <a:srgbClr val="000000"/>
+                </a:solidFill>
+                <a:latin typeface="細明體" panose="02020509000000000000" pitchFamily="49" charset="-120"/>
+                <a:ea typeface="細明體" panose="02020509000000000000" pitchFamily="49" charset="-120"/>
+              </a:rPr>
+              <a:t>,</a:t>
+            </a:r>
+          </a:p>
+          <a:p>
+            <a:r>
+              <a:rPr lang="zh-TW" altLang="en-US" dirty="0" smtClean="0">
+                <a:solidFill>
+                  <a:srgbClr val="000000"/>
+                </a:solidFill>
+                <a:latin typeface="細明體" panose="02020509000000000000" pitchFamily="49" charset="-120"/>
+                <a:ea typeface="細明體" panose="02020509000000000000" pitchFamily="49" charset="-120"/>
+              </a:rPr>
+              <a:t>                                </a:t>
+            </a:r>
+            <a:r>
+              <a:rPr lang="en-US" altLang="zh-TW" dirty="0" smtClean="0">
+                <a:solidFill>
+                  <a:srgbClr val="A31515"/>
+                </a:solidFill>
+                <a:latin typeface="細明體" panose="02020509000000000000" pitchFamily="49" charset="-120"/>
+                <a:ea typeface="細明體" panose="02020509000000000000" pitchFamily="49" charset="-120"/>
+              </a:rPr>
+              <a:t>"    ***    "</a:t>
+            </a:r>
+            <a:r>
+              <a:rPr lang="en-US" altLang="zh-TW" dirty="0" smtClean="0">
+                <a:solidFill>
+                  <a:srgbClr val="000000"/>
+                </a:solidFill>
+                <a:latin typeface="細明體" panose="02020509000000000000" pitchFamily="49" charset="-120"/>
+                <a:ea typeface="細明體" panose="02020509000000000000" pitchFamily="49" charset="-120"/>
+              </a:rPr>
+              <a:t>,</a:t>
+            </a:r>
+          </a:p>
+          <a:p>
+            <a:r>
+              <a:rPr lang="zh-TW" altLang="en-US" dirty="0" smtClean="0">
+                <a:solidFill>
+                  <a:srgbClr val="000000"/>
+                </a:solidFill>
+                <a:latin typeface="細明體" panose="02020509000000000000" pitchFamily="49" charset="-120"/>
+                <a:ea typeface="細明體" panose="02020509000000000000" pitchFamily="49" charset="-120"/>
+              </a:rPr>
+              <a:t>                                </a:t>
+            </a:r>
+            <a:r>
+              <a:rPr lang="en-US" altLang="zh-TW" dirty="0" smtClean="0">
+                <a:solidFill>
+                  <a:srgbClr val="A31515"/>
+                </a:solidFill>
+                <a:latin typeface="細明體" panose="02020509000000000000" pitchFamily="49" charset="-120"/>
+                <a:ea typeface="細明體" panose="02020509000000000000" pitchFamily="49" charset="-120"/>
+              </a:rPr>
+              <a:t>"    ***    "</a:t>
+            </a:r>
+            <a:r>
+              <a:rPr lang="en-US" altLang="zh-TW" dirty="0" smtClean="0">
+                <a:solidFill>
+                  <a:srgbClr val="000000"/>
+                </a:solidFill>
+                <a:latin typeface="細明體" panose="02020509000000000000" pitchFamily="49" charset="-120"/>
+                <a:ea typeface="細明體" panose="02020509000000000000" pitchFamily="49" charset="-120"/>
+              </a:rPr>
+              <a:t>,</a:t>
+            </a:r>
+          </a:p>
+          <a:p>
+            <a:r>
+              <a:rPr lang="zh-TW" altLang="en-US" dirty="0" smtClean="0">
+                <a:solidFill>
+                  <a:srgbClr val="000000"/>
+                </a:solidFill>
+                <a:latin typeface="細明體" panose="02020509000000000000" pitchFamily="49" charset="-120"/>
+                <a:ea typeface="細明體" panose="02020509000000000000" pitchFamily="49" charset="-120"/>
+              </a:rPr>
+              <a:t>                                </a:t>
+            </a:r>
+            <a:r>
+              <a:rPr lang="en-US" altLang="zh-TW" dirty="0" smtClean="0">
+                <a:solidFill>
+                  <a:srgbClr val="A31515"/>
+                </a:solidFill>
+                <a:latin typeface="細明體" panose="02020509000000000000" pitchFamily="49" charset="-120"/>
+                <a:ea typeface="細明體" panose="02020509000000000000" pitchFamily="49" charset="-120"/>
+              </a:rPr>
+              <a:t>"    ***    "</a:t>
+            </a:r>
+            <a:r>
+              <a:rPr lang="en-US" altLang="zh-TW" dirty="0" smtClean="0">
+                <a:solidFill>
+                  <a:srgbClr val="000000"/>
+                </a:solidFill>
+                <a:latin typeface="細明體" panose="02020509000000000000" pitchFamily="49" charset="-120"/>
+                <a:ea typeface="細明體" panose="02020509000000000000" pitchFamily="49" charset="-120"/>
+              </a:rPr>
+              <a:t>,</a:t>
+            </a:r>
+          </a:p>
+          <a:p>
+            <a:r>
+              <a:rPr lang="zh-TW" altLang="en-US" dirty="0" smtClean="0">
+                <a:solidFill>
+                  <a:srgbClr val="000000"/>
+                </a:solidFill>
+                <a:latin typeface="細明體" panose="02020509000000000000" pitchFamily="49" charset="-120"/>
+                <a:ea typeface="細明體" panose="02020509000000000000" pitchFamily="49" charset="-120"/>
+              </a:rPr>
+              <a:t>                                </a:t>
+            </a:r>
+            <a:r>
+              <a:rPr lang="en-US" altLang="zh-TW" dirty="0" smtClean="0">
+                <a:solidFill>
+                  <a:srgbClr val="A31515"/>
+                </a:solidFill>
+                <a:latin typeface="細明體" panose="02020509000000000000" pitchFamily="49" charset="-120"/>
+                <a:ea typeface="細明體" panose="02020509000000000000" pitchFamily="49" charset="-120"/>
+              </a:rPr>
+              <a:t>"           "</a:t>
+            </a:r>
+            <a:endParaRPr lang="zh-TW" altLang="en-US" dirty="0"/>
+          </a:p>
+        </p:txBody>
+      </p:sp>
     </p:spTree>
     <p:extLst>
       <p:ext uri="{BB962C8B-B14F-4D97-AF65-F5344CB8AC3E}">
@@ -6208,36 +7099,497 @@
           </a:p>
         </p:txBody>
       </p:sp>
-      <p:pic>
-        <p:nvPicPr>
-          <p:cNvPr id="5" name="圖片 4"/>
-          <p:cNvPicPr>
-            <a:picLocks noChangeAspect="1"/>
-          </p:cNvPicPr>
+      <p:sp>
+        <p:nvSpPr>
+          <p:cNvPr id="6" name="矩形 5"/>
+          <p:cNvSpPr/>
           <p:nvPr/>
-        </p:nvPicPr>
-        <p:blipFill>
-          <a:blip r:embed="rId2">
-            <a:extLst>
-              <a:ext uri="{28A0092B-C50C-407E-A947-70E740481C1C}">
-                <a14:useLocalDpi xmlns:a14="http://schemas.microsoft.com/office/drawing/2010/main" val="0"/>
-              </a:ext>
-            </a:extLst>
-          </a:blip>
-          <a:stretch>
-            <a:fillRect/>
-          </a:stretch>
-        </p:blipFill>
+        </p:nvSpPr>
         <p:spPr>
           <a:xfrm>
-            <a:off x="8873720" y="1739582"/>
-            <a:ext cx="2552350" cy="4454101"/>
+            <a:off x="4721226" y="1981474"/>
+            <a:ext cx="6096000" cy="3970318"/>
           </a:xfrm>
           <a:prstGeom prst="rect">
             <a:avLst/>
           </a:prstGeom>
+          <a:solidFill>
+            <a:schemeClr val="tx1"/>
+          </a:solidFill>
         </p:spPr>
-      </p:pic>
+        <p:txBody>
+          <a:bodyPr>
+            <a:spAutoFit/>
+          </a:bodyPr>
+          <a:lstStyle/>
+          <a:p>
+            <a:r>
+              <a:rPr lang="en-US" altLang="zh-TW" dirty="0" smtClean="0">
+                <a:solidFill>
+                  <a:srgbClr val="000000"/>
+                </a:solidFill>
+                <a:latin typeface="細明體" panose="02020509000000000000" pitchFamily="49" charset="-120"/>
+                <a:ea typeface="細明體" panose="02020509000000000000" pitchFamily="49" charset="-120"/>
+              </a:rPr>
+              <a:t> </a:t>
+            </a:r>
+            <a:r>
+              <a:rPr lang="en-US" altLang="zh-TW" dirty="0" smtClean="0">
+                <a:solidFill>
+                  <a:srgbClr val="008000"/>
+                </a:solidFill>
+                <a:latin typeface="細明體" panose="02020509000000000000" pitchFamily="49" charset="-120"/>
+                <a:ea typeface="細明體" panose="02020509000000000000" pitchFamily="49" charset="-120"/>
+              </a:rPr>
+              <a:t>// spear</a:t>
+            </a:r>
+            <a:endParaRPr lang="en-US" altLang="zh-TW" dirty="0" smtClean="0">
+              <a:solidFill>
+                <a:srgbClr val="000000"/>
+              </a:solidFill>
+              <a:latin typeface="細明體" panose="02020509000000000000" pitchFamily="49" charset="-120"/>
+              <a:ea typeface="細明體" panose="02020509000000000000" pitchFamily="49" charset="-120"/>
+            </a:endParaRPr>
+          </a:p>
+          <a:p>
+            <a:r>
+              <a:rPr lang="en-US" altLang="zh-TW" dirty="0" smtClean="0">
+                <a:solidFill>
+                  <a:srgbClr val="000000"/>
+                </a:solidFill>
+                <a:latin typeface="細明體" panose="02020509000000000000" pitchFamily="49" charset="-120"/>
+                <a:ea typeface="細明體" panose="02020509000000000000" pitchFamily="49" charset="-120"/>
+              </a:rPr>
+              <a:t>                            </a:t>
+            </a:r>
+            <a:r>
+              <a:rPr lang="en-US" altLang="zh-TW" dirty="0" err="1" smtClean="0">
+                <a:solidFill>
+                  <a:srgbClr val="000000"/>
+                </a:solidFill>
+                <a:latin typeface="細明體" panose="02020509000000000000" pitchFamily="49" charset="-120"/>
+                <a:ea typeface="細明體" panose="02020509000000000000" pitchFamily="49" charset="-120"/>
+              </a:rPr>
+              <a:t>img</a:t>
+            </a:r>
+            <a:r>
+              <a:rPr lang="en-US" altLang="zh-TW" dirty="0" smtClean="0">
+                <a:solidFill>
+                  <a:srgbClr val="000000"/>
+                </a:solidFill>
+                <a:latin typeface="細明體" panose="02020509000000000000" pitchFamily="49" charset="-120"/>
+                <a:ea typeface="細明體" panose="02020509000000000000" pitchFamily="49" charset="-120"/>
+              </a:rPr>
+              <a:t> = </a:t>
+            </a:r>
+            <a:r>
+              <a:rPr lang="en-US" altLang="zh-TW" dirty="0" smtClean="0">
+                <a:solidFill>
+                  <a:srgbClr val="0000FF"/>
+                </a:solidFill>
+                <a:latin typeface="細明體" panose="02020509000000000000" pitchFamily="49" charset="-120"/>
+                <a:ea typeface="細明體" panose="02020509000000000000" pitchFamily="49" charset="-120"/>
+              </a:rPr>
+              <a:t>new</a:t>
+            </a:r>
+            <a:r>
+              <a:rPr lang="en-US" altLang="zh-TW" dirty="0" smtClean="0">
+                <a:solidFill>
+                  <a:srgbClr val="000000"/>
+                </a:solidFill>
+                <a:latin typeface="細明體" panose="02020509000000000000" pitchFamily="49" charset="-120"/>
+                <a:ea typeface="細明體" panose="02020509000000000000" pitchFamily="49" charset="-120"/>
+              </a:rPr>
+              <a:t> </a:t>
+            </a:r>
+            <a:r>
+              <a:rPr lang="en-US" altLang="zh-TW" dirty="0" smtClean="0">
+                <a:solidFill>
+                  <a:srgbClr val="0000FF"/>
+                </a:solidFill>
+                <a:latin typeface="細明體" panose="02020509000000000000" pitchFamily="49" charset="-120"/>
+                <a:ea typeface="細明體" panose="02020509000000000000" pitchFamily="49" charset="-120"/>
+              </a:rPr>
+              <a:t>string</a:t>
+            </a:r>
+            <a:r>
+              <a:rPr lang="en-US" altLang="zh-TW" dirty="0" smtClean="0">
+                <a:solidFill>
+                  <a:srgbClr val="000000"/>
+                </a:solidFill>
+                <a:latin typeface="細明體" panose="02020509000000000000" pitchFamily="49" charset="-120"/>
+                <a:ea typeface="細明體" panose="02020509000000000000" pitchFamily="49" charset="-120"/>
+              </a:rPr>
+              <a:t>[]</a:t>
+            </a:r>
+          </a:p>
+          <a:p>
+            <a:r>
+              <a:rPr lang="zh-TW" altLang="en-US" dirty="0" smtClean="0">
+                <a:solidFill>
+                  <a:srgbClr val="000000"/>
+                </a:solidFill>
+                <a:latin typeface="細明體" panose="02020509000000000000" pitchFamily="49" charset="-120"/>
+                <a:ea typeface="細明體" panose="02020509000000000000" pitchFamily="49" charset="-120"/>
+              </a:rPr>
+              <a:t>                            </a:t>
+            </a:r>
+            <a:r>
+              <a:rPr lang="en-US" altLang="zh-TW" dirty="0" smtClean="0">
+                <a:solidFill>
+                  <a:srgbClr val="000000"/>
+                </a:solidFill>
+                <a:latin typeface="細明體" panose="02020509000000000000" pitchFamily="49" charset="-120"/>
+                <a:ea typeface="細明體" panose="02020509000000000000" pitchFamily="49" charset="-120"/>
+              </a:rPr>
+              <a:t>{</a:t>
+            </a:r>
+          </a:p>
+          <a:p>
+            <a:r>
+              <a:rPr lang="zh-TW" altLang="en-US" dirty="0" smtClean="0">
+                <a:solidFill>
+                  <a:srgbClr val="000000"/>
+                </a:solidFill>
+                <a:latin typeface="細明體" panose="02020509000000000000" pitchFamily="49" charset="-120"/>
+                <a:ea typeface="細明體" panose="02020509000000000000" pitchFamily="49" charset="-120"/>
+              </a:rPr>
+              <a:t>                                </a:t>
+            </a:r>
+            <a:r>
+              <a:rPr lang="en-US" altLang="zh-TW" dirty="0" smtClean="0">
+                <a:solidFill>
+                  <a:srgbClr val="A31515"/>
+                </a:solidFill>
+                <a:latin typeface="細明體" panose="02020509000000000000" pitchFamily="49" charset="-120"/>
+                <a:ea typeface="細明體" panose="02020509000000000000" pitchFamily="49" charset="-120"/>
+              </a:rPr>
+              <a:t>"     *     "</a:t>
+            </a:r>
+            <a:r>
+              <a:rPr lang="en-US" altLang="zh-TW" dirty="0" smtClean="0">
+                <a:solidFill>
+                  <a:srgbClr val="000000"/>
+                </a:solidFill>
+                <a:latin typeface="細明體" panose="02020509000000000000" pitchFamily="49" charset="-120"/>
+                <a:ea typeface="細明體" panose="02020509000000000000" pitchFamily="49" charset="-120"/>
+              </a:rPr>
+              <a:t>,</a:t>
+            </a:r>
+          </a:p>
+          <a:p>
+            <a:r>
+              <a:rPr lang="zh-TW" altLang="en-US" dirty="0" smtClean="0">
+                <a:solidFill>
+                  <a:srgbClr val="000000"/>
+                </a:solidFill>
+                <a:latin typeface="細明體" panose="02020509000000000000" pitchFamily="49" charset="-120"/>
+                <a:ea typeface="細明體" panose="02020509000000000000" pitchFamily="49" charset="-120"/>
+              </a:rPr>
+              <a:t>                                </a:t>
+            </a:r>
+            <a:r>
+              <a:rPr lang="en-US" altLang="zh-TW" dirty="0" smtClean="0">
+                <a:solidFill>
+                  <a:srgbClr val="A31515"/>
+                </a:solidFill>
+                <a:latin typeface="細明體" panose="02020509000000000000" pitchFamily="49" charset="-120"/>
+                <a:ea typeface="細明體" panose="02020509000000000000" pitchFamily="49" charset="-120"/>
+              </a:rPr>
+              <a:t>"    ***    "</a:t>
+            </a:r>
+            <a:r>
+              <a:rPr lang="en-US" altLang="zh-TW" dirty="0" smtClean="0">
+                <a:solidFill>
+                  <a:srgbClr val="000000"/>
+                </a:solidFill>
+                <a:latin typeface="細明體" panose="02020509000000000000" pitchFamily="49" charset="-120"/>
+                <a:ea typeface="細明體" panose="02020509000000000000" pitchFamily="49" charset="-120"/>
+              </a:rPr>
+              <a:t>,</a:t>
+            </a:r>
+          </a:p>
+          <a:p>
+            <a:r>
+              <a:rPr lang="zh-TW" altLang="en-US" dirty="0" smtClean="0">
+                <a:solidFill>
+                  <a:srgbClr val="000000"/>
+                </a:solidFill>
+                <a:latin typeface="細明體" panose="02020509000000000000" pitchFamily="49" charset="-120"/>
+                <a:ea typeface="細明體" panose="02020509000000000000" pitchFamily="49" charset="-120"/>
+              </a:rPr>
+              <a:t>                                </a:t>
+            </a:r>
+            <a:r>
+              <a:rPr lang="en-US" altLang="zh-TW" dirty="0" smtClean="0">
+                <a:solidFill>
+                  <a:srgbClr val="A31515"/>
+                </a:solidFill>
+                <a:latin typeface="細明體" panose="02020509000000000000" pitchFamily="49" charset="-120"/>
+                <a:ea typeface="細明體" panose="02020509000000000000" pitchFamily="49" charset="-120"/>
+              </a:rPr>
+              <a:t>"   *****   "</a:t>
+            </a:r>
+            <a:r>
+              <a:rPr lang="en-US" altLang="zh-TW" dirty="0" smtClean="0">
+                <a:solidFill>
+                  <a:srgbClr val="000000"/>
+                </a:solidFill>
+                <a:latin typeface="細明體" panose="02020509000000000000" pitchFamily="49" charset="-120"/>
+                <a:ea typeface="細明體" panose="02020509000000000000" pitchFamily="49" charset="-120"/>
+              </a:rPr>
+              <a:t>,</a:t>
+            </a:r>
+          </a:p>
+          <a:p>
+            <a:r>
+              <a:rPr lang="zh-TW" altLang="en-US" dirty="0" smtClean="0">
+                <a:solidFill>
+                  <a:srgbClr val="000000"/>
+                </a:solidFill>
+                <a:latin typeface="細明體" panose="02020509000000000000" pitchFamily="49" charset="-120"/>
+                <a:ea typeface="細明體" panose="02020509000000000000" pitchFamily="49" charset="-120"/>
+              </a:rPr>
+              <a:t>                                </a:t>
+            </a:r>
+            <a:r>
+              <a:rPr lang="en-US" altLang="zh-TW" dirty="0" smtClean="0">
+                <a:solidFill>
+                  <a:srgbClr val="A31515"/>
+                </a:solidFill>
+                <a:latin typeface="細明體" panose="02020509000000000000" pitchFamily="49" charset="-120"/>
+                <a:ea typeface="細明體" panose="02020509000000000000" pitchFamily="49" charset="-120"/>
+              </a:rPr>
+              <a:t>"  *******  "</a:t>
+            </a:r>
+            <a:r>
+              <a:rPr lang="en-US" altLang="zh-TW" dirty="0" smtClean="0">
+                <a:solidFill>
+                  <a:srgbClr val="000000"/>
+                </a:solidFill>
+                <a:latin typeface="細明體" panose="02020509000000000000" pitchFamily="49" charset="-120"/>
+                <a:ea typeface="細明體" panose="02020509000000000000" pitchFamily="49" charset="-120"/>
+              </a:rPr>
+              <a:t>,</a:t>
+            </a:r>
+          </a:p>
+          <a:p>
+            <a:r>
+              <a:rPr lang="zh-TW" altLang="en-US" dirty="0" smtClean="0">
+                <a:solidFill>
+                  <a:srgbClr val="000000"/>
+                </a:solidFill>
+                <a:latin typeface="細明體" panose="02020509000000000000" pitchFamily="49" charset="-120"/>
+                <a:ea typeface="細明體" panose="02020509000000000000" pitchFamily="49" charset="-120"/>
+              </a:rPr>
+              <a:t>                                </a:t>
+            </a:r>
+            <a:r>
+              <a:rPr lang="en-US" altLang="zh-TW" dirty="0" smtClean="0">
+                <a:solidFill>
+                  <a:srgbClr val="A31515"/>
+                </a:solidFill>
+                <a:latin typeface="細明體" panose="02020509000000000000" pitchFamily="49" charset="-120"/>
+                <a:ea typeface="細明體" panose="02020509000000000000" pitchFamily="49" charset="-120"/>
+              </a:rPr>
+              <a:t>"     *     "</a:t>
+            </a:r>
+            <a:r>
+              <a:rPr lang="en-US" altLang="zh-TW" dirty="0" smtClean="0">
+                <a:solidFill>
+                  <a:srgbClr val="000000"/>
+                </a:solidFill>
+                <a:latin typeface="細明體" panose="02020509000000000000" pitchFamily="49" charset="-120"/>
+                <a:ea typeface="細明體" panose="02020509000000000000" pitchFamily="49" charset="-120"/>
+              </a:rPr>
+              <a:t>,</a:t>
+            </a:r>
+          </a:p>
+          <a:p>
+            <a:r>
+              <a:rPr lang="zh-TW" altLang="en-US" dirty="0" smtClean="0">
+                <a:solidFill>
+                  <a:srgbClr val="000000"/>
+                </a:solidFill>
+                <a:latin typeface="細明體" panose="02020509000000000000" pitchFamily="49" charset="-120"/>
+                <a:ea typeface="細明體" panose="02020509000000000000" pitchFamily="49" charset="-120"/>
+              </a:rPr>
+              <a:t>                                </a:t>
+            </a:r>
+            <a:r>
+              <a:rPr lang="en-US" altLang="zh-TW" dirty="0" smtClean="0">
+                <a:solidFill>
+                  <a:srgbClr val="A31515"/>
+                </a:solidFill>
+                <a:latin typeface="細明體" panose="02020509000000000000" pitchFamily="49" charset="-120"/>
+                <a:ea typeface="細明體" panose="02020509000000000000" pitchFamily="49" charset="-120"/>
+              </a:rPr>
+              <a:t>"     *     "</a:t>
+            </a:r>
+            <a:r>
+              <a:rPr lang="en-US" altLang="zh-TW" dirty="0" smtClean="0">
+                <a:solidFill>
+                  <a:srgbClr val="000000"/>
+                </a:solidFill>
+                <a:latin typeface="細明體" panose="02020509000000000000" pitchFamily="49" charset="-120"/>
+                <a:ea typeface="細明體" panose="02020509000000000000" pitchFamily="49" charset="-120"/>
+              </a:rPr>
+              <a:t>,</a:t>
+            </a:r>
+          </a:p>
+          <a:p>
+            <a:r>
+              <a:rPr lang="zh-TW" altLang="en-US" dirty="0" smtClean="0">
+                <a:solidFill>
+                  <a:srgbClr val="000000"/>
+                </a:solidFill>
+                <a:latin typeface="細明體" panose="02020509000000000000" pitchFamily="49" charset="-120"/>
+                <a:ea typeface="細明體" panose="02020509000000000000" pitchFamily="49" charset="-120"/>
+              </a:rPr>
+              <a:t>                                </a:t>
+            </a:r>
+            <a:r>
+              <a:rPr lang="en-US" altLang="zh-TW" dirty="0" smtClean="0">
+                <a:solidFill>
+                  <a:srgbClr val="A31515"/>
+                </a:solidFill>
+                <a:latin typeface="細明體" panose="02020509000000000000" pitchFamily="49" charset="-120"/>
+                <a:ea typeface="細明體" panose="02020509000000000000" pitchFamily="49" charset="-120"/>
+              </a:rPr>
+              <a:t>"     *     "</a:t>
+            </a:r>
+            <a:r>
+              <a:rPr lang="en-US" altLang="zh-TW" dirty="0" smtClean="0">
+                <a:solidFill>
+                  <a:srgbClr val="000000"/>
+                </a:solidFill>
+                <a:latin typeface="細明體" panose="02020509000000000000" pitchFamily="49" charset="-120"/>
+                <a:ea typeface="細明體" panose="02020509000000000000" pitchFamily="49" charset="-120"/>
+              </a:rPr>
+              <a:t>,</a:t>
+            </a:r>
+          </a:p>
+          <a:p>
+            <a:r>
+              <a:rPr lang="zh-TW" altLang="en-US" dirty="0" smtClean="0">
+                <a:solidFill>
+                  <a:srgbClr val="000000"/>
+                </a:solidFill>
+                <a:latin typeface="細明體" panose="02020509000000000000" pitchFamily="49" charset="-120"/>
+                <a:ea typeface="細明體" panose="02020509000000000000" pitchFamily="49" charset="-120"/>
+              </a:rPr>
+              <a:t>                                </a:t>
+            </a:r>
+            <a:r>
+              <a:rPr lang="en-US" altLang="zh-TW" dirty="0" smtClean="0">
+                <a:solidFill>
+                  <a:srgbClr val="A31515"/>
+                </a:solidFill>
+                <a:latin typeface="細明體" panose="02020509000000000000" pitchFamily="49" charset="-120"/>
+                <a:ea typeface="細明體" panose="02020509000000000000" pitchFamily="49" charset="-120"/>
+              </a:rPr>
+              <a:t>"     *     "</a:t>
+            </a:r>
+            <a:r>
+              <a:rPr lang="en-US" altLang="zh-TW" dirty="0" smtClean="0">
+                <a:solidFill>
+                  <a:srgbClr val="000000"/>
+                </a:solidFill>
+                <a:latin typeface="細明體" panose="02020509000000000000" pitchFamily="49" charset="-120"/>
+                <a:ea typeface="細明體" panose="02020509000000000000" pitchFamily="49" charset="-120"/>
+              </a:rPr>
+              <a:t>,</a:t>
+            </a:r>
+          </a:p>
+          <a:p>
+            <a:r>
+              <a:rPr lang="zh-TW" altLang="en-US" dirty="0" smtClean="0">
+                <a:solidFill>
+                  <a:srgbClr val="000000"/>
+                </a:solidFill>
+                <a:latin typeface="細明體" panose="02020509000000000000" pitchFamily="49" charset="-120"/>
+                <a:ea typeface="細明體" panose="02020509000000000000" pitchFamily="49" charset="-120"/>
+              </a:rPr>
+              <a:t>                                </a:t>
+            </a:r>
+            <a:r>
+              <a:rPr lang="en-US" altLang="zh-TW" dirty="0" smtClean="0">
+                <a:solidFill>
+                  <a:srgbClr val="A31515"/>
+                </a:solidFill>
+                <a:latin typeface="細明體" panose="02020509000000000000" pitchFamily="49" charset="-120"/>
+                <a:ea typeface="細明體" panose="02020509000000000000" pitchFamily="49" charset="-120"/>
+              </a:rPr>
+              <a:t>"     *     "</a:t>
+            </a:r>
+            <a:r>
+              <a:rPr lang="en-US" altLang="zh-TW" dirty="0" smtClean="0">
+                <a:solidFill>
+                  <a:srgbClr val="000000"/>
+                </a:solidFill>
+                <a:latin typeface="細明體" panose="02020509000000000000" pitchFamily="49" charset="-120"/>
+                <a:ea typeface="細明體" panose="02020509000000000000" pitchFamily="49" charset="-120"/>
+              </a:rPr>
+              <a:t>,</a:t>
+            </a:r>
+          </a:p>
+          <a:p>
+            <a:r>
+              <a:rPr lang="zh-TW" altLang="en-US" dirty="0" smtClean="0">
+                <a:solidFill>
+                  <a:srgbClr val="000000"/>
+                </a:solidFill>
+                <a:latin typeface="細明體" panose="02020509000000000000" pitchFamily="49" charset="-120"/>
+                <a:ea typeface="細明體" panose="02020509000000000000" pitchFamily="49" charset="-120"/>
+              </a:rPr>
+              <a:t>                                </a:t>
+            </a:r>
+            <a:r>
+              <a:rPr lang="en-US" altLang="zh-TW" dirty="0" smtClean="0">
+                <a:solidFill>
+                  <a:srgbClr val="A31515"/>
+                </a:solidFill>
+                <a:latin typeface="細明體" panose="02020509000000000000" pitchFamily="49" charset="-120"/>
+                <a:ea typeface="細明體" panose="02020509000000000000" pitchFamily="49" charset="-120"/>
+              </a:rPr>
+              <a:t>"     *     "</a:t>
+            </a:r>
+            <a:r>
+              <a:rPr lang="en-US" altLang="zh-TW" dirty="0" smtClean="0">
+                <a:solidFill>
+                  <a:srgbClr val="000000"/>
+                </a:solidFill>
+                <a:latin typeface="細明體" panose="02020509000000000000" pitchFamily="49" charset="-120"/>
+                <a:ea typeface="細明體" panose="02020509000000000000" pitchFamily="49" charset="-120"/>
+              </a:rPr>
+              <a:t>,</a:t>
+            </a:r>
+          </a:p>
+          <a:p>
+            <a:r>
+              <a:rPr lang="zh-TW" altLang="en-US" dirty="0" smtClean="0">
+                <a:solidFill>
+                  <a:srgbClr val="000000"/>
+                </a:solidFill>
+                <a:latin typeface="細明體" panose="02020509000000000000" pitchFamily="49" charset="-120"/>
+                <a:ea typeface="細明體" panose="02020509000000000000" pitchFamily="49" charset="-120"/>
+              </a:rPr>
+              <a:t>                                </a:t>
+            </a:r>
+            <a:r>
+              <a:rPr lang="en-US" altLang="zh-TW" dirty="0" smtClean="0">
+                <a:solidFill>
+                  <a:srgbClr val="A31515"/>
+                </a:solidFill>
+                <a:latin typeface="細明體" panose="02020509000000000000" pitchFamily="49" charset="-120"/>
+                <a:ea typeface="細明體" panose="02020509000000000000" pitchFamily="49" charset="-120"/>
+              </a:rPr>
+              <a:t>"           "</a:t>
+            </a:r>
+            <a:endParaRPr lang="zh-TW" altLang="en-US" dirty="0"/>
+          </a:p>
+        </p:txBody>
+      </p:sp>
     </p:spTree>
     <p:extLst>
       <p:ext uri="{BB962C8B-B14F-4D97-AF65-F5344CB8AC3E}">
@@ -7871,7 +9223,6 @@
               <a:rPr lang="en-US" altLang="zh-TW" sz="2400" dirty="0" smtClean="0"/>
               <a:t>The height and width of each bitmap are 11 bits</a:t>
             </a:r>
-            <a:endParaRPr lang="en-US" altLang="zh-TW" sz="2400" dirty="0" smtClean="0"/>
           </a:p>
           <a:p>
             <a:r>
@@ -8001,46 +9352,513 @@
           <a:p>
             <a:r>
               <a:rPr lang="en-US" altLang="zh-TW" sz="2400" dirty="0" smtClean="0"/>
-              <a:t>Hero bitmap</a:t>
-            </a:r>
-            <a:endParaRPr lang="en-US" altLang="zh-TW" sz="2400" dirty="0">
-              <a:solidFill>
-                <a:srgbClr val="FF0000"/>
-              </a:solidFill>
-            </a:endParaRPr>
-          </a:p>
-        </p:txBody>
-      </p:sp>
-      <p:pic>
-        <p:nvPicPr>
-          <p:cNvPr id="5" name="圖片 4"/>
-          <p:cNvPicPr>
-            <a:picLocks noChangeAspect="1"/>
-          </p:cNvPicPr>
+              <a:t>Hero </a:t>
+            </a:r>
+            <a:r>
+              <a:rPr lang="en-US" altLang="zh-TW" sz="2400" dirty="0" smtClean="0"/>
+              <a:t>bitmap</a:t>
+            </a:r>
+          </a:p>
+          <a:p>
+            <a:r>
+              <a:rPr lang="en-US" altLang="zh-TW" sz="2400" dirty="0" smtClean="0"/>
+              <a:t>You can copy it directly</a:t>
+            </a:r>
+            <a:endParaRPr lang="en-US" altLang="zh-TW" sz="2400" dirty="0"/>
+          </a:p>
+        </p:txBody>
+      </p:sp>
+      <p:sp>
+        <p:nvSpPr>
+          <p:cNvPr id="6" name="矩形 5"/>
+          <p:cNvSpPr/>
           <p:nvPr/>
-        </p:nvPicPr>
-        <p:blipFill>
-          <a:blip r:embed="rId2">
-            <a:extLst>
-              <a:ext uri="{28A0092B-C50C-407E-A947-70E740481C1C}">
-                <a14:useLocalDpi xmlns:a14="http://schemas.microsoft.com/office/drawing/2010/main" val="0"/>
-              </a:ext>
-            </a:extLst>
-          </a:blip>
-          <a:stretch>
-            <a:fillRect/>
-          </a:stretch>
-        </p:blipFill>
+        </p:nvSpPr>
         <p:spPr>
           <a:xfrm>
-            <a:off x="8843671" y="1523224"/>
-            <a:ext cx="2612449" cy="4886817"/>
+            <a:off x="4721226" y="1981474"/>
+            <a:ext cx="6096000" cy="3970318"/>
           </a:xfrm>
           <a:prstGeom prst="rect">
             <a:avLst/>
           </a:prstGeom>
+          <a:solidFill>
+            <a:schemeClr val="tx1"/>
+          </a:solidFill>
         </p:spPr>
-      </p:pic>
+        <p:txBody>
+          <a:bodyPr>
+            <a:spAutoFit/>
+          </a:bodyPr>
+          <a:lstStyle/>
+          <a:p>
+            <a:r>
+              <a:rPr lang="en-US" altLang="zh-TW" dirty="0" smtClean="0">
+                <a:solidFill>
+                  <a:srgbClr val="000000"/>
+                </a:solidFill>
+                <a:latin typeface="細明體" panose="02020509000000000000" pitchFamily="49" charset="-120"/>
+                <a:ea typeface="細明體" panose="02020509000000000000" pitchFamily="49" charset="-120"/>
+              </a:rPr>
+              <a:t> </a:t>
+            </a:r>
+            <a:r>
+              <a:rPr lang="en-US" altLang="zh-TW" dirty="0" smtClean="0">
+                <a:solidFill>
+                  <a:srgbClr val="008000"/>
+                </a:solidFill>
+                <a:latin typeface="細明體" panose="02020509000000000000" pitchFamily="49" charset="-120"/>
+                <a:ea typeface="細明體" panose="02020509000000000000" pitchFamily="49" charset="-120"/>
+              </a:rPr>
+              <a:t>// hero</a:t>
+            </a:r>
+            <a:endParaRPr lang="en-US" altLang="zh-TW" dirty="0" smtClean="0">
+              <a:solidFill>
+                <a:srgbClr val="000000"/>
+              </a:solidFill>
+              <a:latin typeface="細明體" panose="02020509000000000000" pitchFamily="49" charset="-120"/>
+              <a:ea typeface="細明體" panose="02020509000000000000" pitchFamily="49" charset="-120"/>
+            </a:endParaRPr>
+          </a:p>
+          <a:p>
+            <a:r>
+              <a:rPr lang="en-US" altLang="zh-TW" dirty="0" smtClean="0">
+                <a:solidFill>
+                  <a:srgbClr val="000000"/>
+                </a:solidFill>
+                <a:latin typeface="細明體" panose="02020509000000000000" pitchFamily="49" charset="-120"/>
+                <a:ea typeface="細明體" panose="02020509000000000000" pitchFamily="49" charset="-120"/>
+              </a:rPr>
+              <a:t>                            </a:t>
+            </a:r>
+            <a:r>
+              <a:rPr lang="en-US" altLang="zh-TW" dirty="0" err="1" smtClean="0">
+                <a:solidFill>
+                  <a:srgbClr val="000000"/>
+                </a:solidFill>
+                <a:latin typeface="細明體" panose="02020509000000000000" pitchFamily="49" charset="-120"/>
+                <a:ea typeface="細明體" panose="02020509000000000000" pitchFamily="49" charset="-120"/>
+              </a:rPr>
+              <a:t>img</a:t>
+            </a:r>
+            <a:r>
+              <a:rPr lang="en-US" altLang="zh-TW" dirty="0" smtClean="0">
+                <a:solidFill>
+                  <a:srgbClr val="000000"/>
+                </a:solidFill>
+                <a:latin typeface="細明體" panose="02020509000000000000" pitchFamily="49" charset="-120"/>
+                <a:ea typeface="細明體" panose="02020509000000000000" pitchFamily="49" charset="-120"/>
+              </a:rPr>
+              <a:t> = </a:t>
+            </a:r>
+            <a:r>
+              <a:rPr lang="en-US" altLang="zh-TW" dirty="0" smtClean="0">
+                <a:solidFill>
+                  <a:srgbClr val="0000FF"/>
+                </a:solidFill>
+                <a:latin typeface="細明體" panose="02020509000000000000" pitchFamily="49" charset="-120"/>
+                <a:ea typeface="細明體" panose="02020509000000000000" pitchFamily="49" charset="-120"/>
+              </a:rPr>
+              <a:t>new</a:t>
+            </a:r>
+            <a:r>
+              <a:rPr lang="en-US" altLang="zh-TW" dirty="0" smtClean="0">
+                <a:solidFill>
+                  <a:srgbClr val="000000"/>
+                </a:solidFill>
+                <a:latin typeface="細明體" panose="02020509000000000000" pitchFamily="49" charset="-120"/>
+                <a:ea typeface="細明體" panose="02020509000000000000" pitchFamily="49" charset="-120"/>
+              </a:rPr>
+              <a:t> </a:t>
+            </a:r>
+            <a:r>
+              <a:rPr lang="en-US" altLang="zh-TW" dirty="0" smtClean="0">
+                <a:solidFill>
+                  <a:srgbClr val="0000FF"/>
+                </a:solidFill>
+                <a:latin typeface="細明體" panose="02020509000000000000" pitchFamily="49" charset="-120"/>
+                <a:ea typeface="細明體" panose="02020509000000000000" pitchFamily="49" charset="-120"/>
+              </a:rPr>
+              <a:t>string</a:t>
+            </a:r>
+            <a:r>
+              <a:rPr lang="en-US" altLang="zh-TW" dirty="0" smtClean="0">
+                <a:solidFill>
+                  <a:srgbClr val="000000"/>
+                </a:solidFill>
+                <a:latin typeface="細明體" panose="02020509000000000000" pitchFamily="49" charset="-120"/>
+                <a:ea typeface="細明體" panose="02020509000000000000" pitchFamily="49" charset="-120"/>
+              </a:rPr>
+              <a:t>[]</a:t>
+            </a:r>
+          </a:p>
+          <a:p>
+            <a:r>
+              <a:rPr lang="zh-TW" altLang="en-US" dirty="0" smtClean="0">
+                <a:solidFill>
+                  <a:srgbClr val="000000"/>
+                </a:solidFill>
+                <a:latin typeface="細明體" panose="02020509000000000000" pitchFamily="49" charset="-120"/>
+                <a:ea typeface="細明體" panose="02020509000000000000" pitchFamily="49" charset="-120"/>
+              </a:rPr>
+              <a:t>                            </a:t>
+            </a:r>
+            <a:r>
+              <a:rPr lang="en-US" altLang="zh-TW" dirty="0" smtClean="0">
+                <a:solidFill>
+                  <a:srgbClr val="000000"/>
+                </a:solidFill>
+                <a:latin typeface="細明體" panose="02020509000000000000" pitchFamily="49" charset="-120"/>
+                <a:ea typeface="細明體" panose="02020509000000000000" pitchFamily="49" charset="-120"/>
+              </a:rPr>
+              <a:t>{</a:t>
+            </a:r>
+          </a:p>
+          <a:p>
+            <a:r>
+              <a:rPr lang="zh-TW" altLang="en-US" dirty="0" smtClean="0">
+                <a:solidFill>
+                  <a:srgbClr val="000000"/>
+                </a:solidFill>
+                <a:latin typeface="細明體" panose="02020509000000000000" pitchFamily="49" charset="-120"/>
+                <a:ea typeface="細明體" panose="02020509000000000000" pitchFamily="49" charset="-120"/>
+              </a:rPr>
+              <a:t>                                </a:t>
+            </a:r>
+            <a:r>
+              <a:rPr lang="en-US" altLang="zh-TW" dirty="0" smtClean="0">
+                <a:solidFill>
+                  <a:srgbClr val="A31515"/>
+                </a:solidFill>
+                <a:latin typeface="細明體" panose="02020509000000000000" pitchFamily="49" charset="-120"/>
+                <a:ea typeface="細明體" panose="02020509000000000000" pitchFamily="49" charset="-120"/>
+              </a:rPr>
+              <a:t>"  *****    "</a:t>
+            </a:r>
+            <a:r>
+              <a:rPr lang="en-US" altLang="zh-TW" dirty="0" smtClean="0">
+                <a:solidFill>
+                  <a:srgbClr val="000000"/>
+                </a:solidFill>
+                <a:latin typeface="細明體" panose="02020509000000000000" pitchFamily="49" charset="-120"/>
+                <a:ea typeface="細明體" panose="02020509000000000000" pitchFamily="49" charset="-120"/>
+              </a:rPr>
+              <a:t>,</a:t>
+            </a:r>
+          </a:p>
+          <a:p>
+            <a:r>
+              <a:rPr lang="zh-TW" altLang="en-US" dirty="0" smtClean="0">
+                <a:solidFill>
+                  <a:srgbClr val="000000"/>
+                </a:solidFill>
+                <a:latin typeface="細明體" panose="02020509000000000000" pitchFamily="49" charset="-120"/>
+                <a:ea typeface="細明體" panose="02020509000000000000" pitchFamily="49" charset="-120"/>
+              </a:rPr>
+              <a:t>                                </a:t>
+            </a:r>
+            <a:r>
+              <a:rPr lang="en-US" altLang="zh-TW" dirty="0" smtClean="0">
+                <a:solidFill>
+                  <a:srgbClr val="A31515"/>
+                </a:solidFill>
+                <a:latin typeface="細明體" panose="02020509000000000000" pitchFamily="49" charset="-120"/>
+                <a:ea typeface="細明體" panose="02020509000000000000" pitchFamily="49" charset="-120"/>
+              </a:rPr>
+              <a:t>"  *   *    "</a:t>
+            </a:r>
+            <a:r>
+              <a:rPr lang="en-US" altLang="zh-TW" dirty="0" smtClean="0">
+                <a:solidFill>
+                  <a:srgbClr val="000000"/>
+                </a:solidFill>
+                <a:latin typeface="細明體" panose="02020509000000000000" pitchFamily="49" charset="-120"/>
+                <a:ea typeface="細明體" panose="02020509000000000000" pitchFamily="49" charset="-120"/>
+              </a:rPr>
+              <a:t>,</a:t>
+            </a:r>
+          </a:p>
+          <a:p>
+            <a:r>
+              <a:rPr lang="zh-TW" altLang="en-US" dirty="0" smtClean="0">
+                <a:solidFill>
+                  <a:srgbClr val="000000"/>
+                </a:solidFill>
+                <a:latin typeface="細明體" panose="02020509000000000000" pitchFamily="49" charset="-120"/>
+                <a:ea typeface="細明體" panose="02020509000000000000" pitchFamily="49" charset="-120"/>
+              </a:rPr>
+              <a:t>                                </a:t>
+            </a:r>
+            <a:r>
+              <a:rPr lang="en-US" altLang="zh-TW" dirty="0" smtClean="0">
+                <a:solidFill>
+                  <a:srgbClr val="A31515"/>
+                </a:solidFill>
+                <a:latin typeface="細明體" panose="02020509000000000000" pitchFamily="49" charset="-120"/>
+                <a:ea typeface="細明體" panose="02020509000000000000" pitchFamily="49" charset="-120"/>
+              </a:rPr>
+              <a:t>"  ***** *  "</a:t>
+            </a:r>
+            <a:r>
+              <a:rPr lang="en-US" altLang="zh-TW" dirty="0" smtClean="0">
+                <a:solidFill>
+                  <a:srgbClr val="000000"/>
+                </a:solidFill>
+                <a:latin typeface="細明體" panose="02020509000000000000" pitchFamily="49" charset="-120"/>
+                <a:ea typeface="細明體" panose="02020509000000000000" pitchFamily="49" charset="-120"/>
+              </a:rPr>
+              <a:t>,</a:t>
+            </a:r>
+          </a:p>
+          <a:p>
+            <a:r>
+              <a:rPr lang="zh-TW" altLang="en-US" dirty="0" smtClean="0">
+                <a:solidFill>
+                  <a:srgbClr val="000000"/>
+                </a:solidFill>
+                <a:latin typeface="細明體" panose="02020509000000000000" pitchFamily="49" charset="-120"/>
+                <a:ea typeface="細明體" panose="02020509000000000000" pitchFamily="49" charset="-120"/>
+              </a:rPr>
+              <a:t>                                </a:t>
+            </a:r>
+            <a:r>
+              <a:rPr lang="en-US" altLang="zh-TW" dirty="0" smtClean="0">
+                <a:solidFill>
+                  <a:srgbClr val="A31515"/>
+                </a:solidFill>
+                <a:latin typeface="細明體" panose="02020509000000000000" pitchFamily="49" charset="-120"/>
+                <a:ea typeface="細明體" panose="02020509000000000000" pitchFamily="49" charset="-120"/>
+              </a:rPr>
+              <a:t>"    *  *  *"</a:t>
+            </a:r>
+            <a:r>
+              <a:rPr lang="en-US" altLang="zh-TW" dirty="0" smtClean="0">
+                <a:solidFill>
+                  <a:srgbClr val="000000"/>
+                </a:solidFill>
+                <a:latin typeface="細明體" panose="02020509000000000000" pitchFamily="49" charset="-120"/>
+                <a:ea typeface="細明體" panose="02020509000000000000" pitchFamily="49" charset="-120"/>
+              </a:rPr>
+              <a:t>,</a:t>
+            </a:r>
+          </a:p>
+          <a:p>
+            <a:r>
+              <a:rPr lang="zh-TW" altLang="en-US" dirty="0" smtClean="0">
+                <a:solidFill>
+                  <a:srgbClr val="000000"/>
+                </a:solidFill>
+                <a:latin typeface="細明體" panose="02020509000000000000" pitchFamily="49" charset="-120"/>
+                <a:ea typeface="細明體" panose="02020509000000000000" pitchFamily="49" charset="-120"/>
+              </a:rPr>
+              <a:t>                                </a:t>
+            </a:r>
+            <a:r>
+              <a:rPr lang="en-US" altLang="zh-TW" dirty="0" smtClean="0">
+                <a:solidFill>
+                  <a:srgbClr val="A31515"/>
+                </a:solidFill>
+                <a:latin typeface="細明體" panose="02020509000000000000" pitchFamily="49" charset="-120"/>
+                <a:ea typeface="細明體" panose="02020509000000000000" pitchFamily="49" charset="-120"/>
+              </a:rPr>
+              <a:t>"    * * *  "</a:t>
+            </a:r>
+            <a:r>
+              <a:rPr lang="en-US" altLang="zh-TW" dirty="0" smtClean="0">
+                <a:solidFill>
+                  <a:srgbClr val="000000"/>
+                </a:solidFill>
+                <a:latin typeface="細明體" panose="02020509000000000000" pitchFamily="49" charset="-120"/>
+                <a:ea typeface="細明體" panose="02020509000000000000" pitchFamily="49" charset="-120"/>
+              </a:rPr>
+              <a:t>,</a:t>
+            </a:r>
+          </a:p>
+          <a:p>
+            <a:r>
+              <a:rPr lang="zh-TW" altLang="en-US" dirty="0" smtClean="0">
+                <a:solidFill>
+                  <a:srgbClr val="000000"/>
+                </a:solidFill>
+                <a:latin typeface="細明體" panose="02020509000000000000" pitchFamily="49" charset="-120"/>
+                <a:ea typeface="細明體" panose="02020509000000000000" pitchFamily="49" charset="-120"/>
+              </a:rPr>
+              <a:t>                                </a:t>
+            </a:r>
+            <a:r>
+              <a:rPr lang="en-US" altLang="zh-TW" dirty="0" smtClean="0">
+                <a:solidFill>
+                  <a:srgbClr val="A31515"/>
+                </a:solidFill>
+                <a:latin typeface="細明體" panose="02020509000000000000" pitchFamily="49" charset="-120"/>
+                <a:ea typeface="細明體" panose="02020509000000000000" pitchFamily="49" charset="-120"/>
+              </a:rPr>
+              <a:t>"    ***    "</a:t>
+            </a:r>
+            <a:r>
+              <a:rPr lang="en-US" altLang="zh-TW" dirty="0" smtClean="0">
+                <a:solidFill>
+                  <a:srgbClr val="000000"/>
+                </a:solidFill>
+                <a:latin typeface="細明體" panose="02020509000000000000" pitchFamily="49" charset="-120"/>
+                <a:ea typeface="細明體" panose="02020509000000000000" pitchFamily="49" charset="-120"/>
+              </a:rPr>
+              <a:t>,</a:t>
+            </a:r>
+          </a:p>
+          <a:p>
+            <a:r>
+              <a:rPr lang="zh-TW" altLang="en-US" dirty="0" smtClean="0">
+                <a:solidFill>
+                  <a:srgbClr val="000000"/>
+                </a:solidFill>
+                <a:latin typeface="細明體" panose="02020509000000000000" pitchFamily="49" charset="-120"/>
+                <a:ea typeface="細明體" panose="02020509000000000000" pitchFamily="49" charset="-120"/>
+              </a:rPr>
+              <a:t>                                </a:t>
+            </a:r>
+            <a:r>
+              <a:rPr lang="en-US" altLang="zh-TW" dirty="0" smtClean="0">
+                <a:solidFill>
+                  <a:srgbClr val="A31515"/>
+                </a:solidFill>
+                <a:latin typeface="細明體" panose="02020509000000000000" pitchFamily="49" charset="-120"/>
+                <a:ea typeface="細明體" panose="02020509000000000000" pitchFamily="49" charset="-120"/>
+              </a:rPr>
+              <a:t>"    *      "</a:t>
+            </a:r>
+            <a:r>
+              <a:rPr lang="en-US" altLang="zh-TW" dirty="0" smtClean="0">
+                <a:solidFill>
+                  <a:srgbClr val="000000"/>
+                </a:solidFill>
+                <a:latin typeface="細明體" panose="02020509000000000000" pitchFamily="49" charset="-120"/>
+                <a:ea typeface="細明體" panose="02020509000000000000" pitchFamily="49" charset="-120"/>
+              </a:rPr>
+              <a:t>,</a:t>
+            </a:r>
+          </a:p>
+          <a:p>
+            <a:r>
+              <a:rPr lang="zh-TW" altLang="en-US" dirty="0" smtClean="0">
+                <a:solidFill>
+                  <a:srgbClr val="000000"/>
+                </a:solidFill>
+                <a:latin typeface="細明體" panose="02020509000000000000" pitchFamily="49" charset="-120"/>
+                <a:ea typeface="細明體" panose="02020509000000000000" pitchFamily="49" charset="-120"/>
+              </a:rPr>
+              <a:t>                                </a:t>
+            </a:r>
+            <a:r>
+              <a:rPr lang="en-US" altLang="zh-TW" dirty="0" smtClean="0">
+                <a:solidFill>
+                  <a:srgbClr val="A31515"/>
+                </a:solidFill>
+                <a:latin typeface="細明體" panose="02020509000000000000" pitchFamily="49" charset="-120"/>
+                <a:ea typeface="細明體" panose="02020509000000000000" pitchFamily="49" charset="-120"/>
+              </a:rPr>
+              <a:t>"   * *     "</a:t>
+            </a:r>
+            <a:r>
+              <a:rPr lang="en-US" altLang="zh-TW" dirty="0" smtClean="0">
+                <a:solidFill>
+                  <a:srgbClr val="000000"/>
+                </a:solidFill>
+                <a:latin typeface="細明體" panose="02020509000000000000" pitchFamily="49" charset="-120"/>
+                <a:ea typeface="細明體" panose="02020509000000000000" pitchFamily="49" charset="-120"/>
+              </a:rPr>
+              <a:t>,</a:t>
+            </a:r>
+          </a:p>
+          <a:p>
+            <a:r>
+              <a:rPr lang="zh-TW" altLang="en-US" dirty="0" smtClean="0">
+                <a:solidFill>
+                  <a:srgbClr val="000000"/>
+                </a:solidFill>
+                <a:latin typeface="細明體" panose="02020509000000000000" pitchFamily="49" charset="-120"/>
+                <a:ea typeface="細明體" panose="02020509000000000000" pitchFamily="49" charset="-120"/>
+              </a:rPr>
+              <a:t>                                </a:t>
+            </a:r>
+            <a:r>
+              <a:rPr lang="en-US" altLang="zh-TW" dirty="0" smtClean="0">
+                <a:solidFill>
+                  <a:srgbClr val="A31515"/>
+                </a:solidFill>
+                <a:latin typeface="細明體" panose="02020509000000000000" pitchFamily="49" charset="-120"/>
+                <a:ea typeface="細明體" panose="02020509000000000000" pitchFamily="49" charset="-120"/>
+              </a:rPr>
+              <a:t>"  *   *    "</a:t>
+            </a:r>
+            <a:r>
+              <a:rPr lang="en-US" altLang="zh-TW" dirty="0" smtClean="0">
+                <a:solidFill>
+                  <a:srgbClr val="000000"/>
+                </a:solidFill>
+                <a:latin typeface="細明體" panose="02020509000000000000" pitchFamily="49" charset="-120"/>
+                <a:ea typeface="細明體" panose="02020509000000000000" pitchFamily="49" charset="-120"/>
+              </a:rPr>
+              <a:t>,</a:t>
+            </a:r>
+          </a:p>
+          <a:p>
+            <a:r>
+              <a:rPr lang="zh-TW" altLang="en-US" dirty="0" smtClean="0">
+                <a:solidFill>
+                  <a:srgbClr val="000000"/>
+                </a:solidFill>
+                <a:latin typeface="細明體" panose="02020509000000000000" pitchFamily="49" charset="-120"/>
+                <a:ea typeface="細明體" panose="02020509000000000000" pitchFamily="49" charset="-120"/>
+              </a:rPr>
+              <a:t>                                </a:t>
+            </a:r>
+            <a:r>
+              <a:rPr lang="en-US" altLang="zh-TW" dirty="0" smtClean="0">
+                <a:solidFill>
+                  <a:srgbClr val="A31515"/>
+                </a:solidFill>
+                <a:latin typeface="細明體" panose="02020509000000000000" pitchFamily="49" charset="-120"/>
+                <a:ea typeface="細明體" panose="02020509000000000000" pitchFamily="49" charset="-120"/>
+              </a:rPr>
+              <a:t>" *     *   "</a:t>
+            </a:r>
+            <a:r>
+              <a:rPr lang="en-US" altLang="zh-TW" dirty="0" smtClean="0">
+                <a:solidFill>
+                  <a:srgbClr val="000000"/>
+                </a:solidFill>
+                <a:latin typeface="細明體" panose="02020509000000000000" pitchFamily="49" charset="-120"/>
+                <a:ea typeface="細明體" panose="02020509000000000000" pitchFamily="49" charset="-120"/>
+              </a:rPr>
+              <a:t>,</a:t>
+            </a:r>
+          </a:p>
+          <a:p>
+            <a:r>
+              <a:rPr lang="zh-TW" altLang="en-US" dirty="0" smtClean="0">
+                <a:solidFill>
+                  <a:srgbClr val="000000"/>
+                </a:solidFill>
+                <a:latin typeface="細明體" panose="02020509000000000000" pitchFamily="49" charset="-120"/>
+                <a:ea typeface="細明體" panose="02020509000000000000" pitchFamily="49" charset="-120"/>
+              </a:rPr>
+              <a:t>                                </a:t>
+            </a:r>
+            <a:r>
+              <a:rPr lang="en-US" altLang="zh-TW" dirty="0" smtClean="0">
+                <a:solidFill>
+                  <a:srgbClr val="A31515"/>
+                </a:solidFill>
+                <a:latin typeface="細明體" panose="02020509000000000000" pitchFamily="49" charset="-120"/>
+                <a:ea typeface="細明體" panose="02020509000000000000" pitchFamily="49" charset="-120"/>
+              </a:rPr>
+              <a:t>" *     *   "</a:t>
+            </a:r>
+            <a:endParaRPr lang="zh-TW" altLang="en-US" dirty="0"/>
+          </a:p>
+        </p:txBody>
+      </p:sp>
     </p:spTree>
     <p:extLst>
       <p:ext uri="{BB962C8B-B14F-4D97-AF65-F5344CB8AC3E}">
@@ -8128,36 +9946,497 @@
           </a:p>
         </p:txBody>
       </p:sp>
-      <p:pic>
-        <p:nvPicPr>
-          <p:cNvPr id="5" name="圖片 4"/>
-          <p:cNvPicPr>
-            <a:picLocks noChangeAspect="1"/>
-          </p:cNvPicPr>
+      <p:sp>
+        <p:nvSpPr>
+          <p:cNvPr id="6" name="矩形 5"/>
+          <p:cNvSpPr/>
           <p:nvPr/>
-        </p:nvPicPr>
-        <p:blipFill>
-          <a:blip r:embed="rId2">
-            <a:extLst>
-              <a:ext uri="{28A0092B-C50C-407E-A947-70E740481C1C}">
-                <a14:useLocalDpi xmlns:a14="http://schemas.microsoft.com/office/drawing/2010/main" val="0"/>
-              </a:ext>
-            </a:extLst>
-          </a:blip>
-          <a:stretch>
-            <a:fillRect/>
-          </a:stretch>
-        </p:blipFill>
+        </p:nvSpPr>
         <p:spPr>
           <a:xfrm>
-            <a:off x="8873720" y="1523224"/>
-            <a:ext cx="2552350" cy="4886817"/>
+            <a:off x="4721226" y="1981474"/>
+            <a:ext cx="6096000" cy="3970318"/>
           </a:xfrm>
           <a:prstGeom prst="rect">
             <a:avLst/>
           </a:prstGeom>
+          <a:solidFill>
+            <a:schemeClr val="tx1"/>
+          </a:solidFill>
         </p:spPr>
-      </p:pic>
+        <p:txBody>
+          <a:bodyPr>
+            <a:spAutoFit/>
+          </a:bodyPr>
+          <a:lstStyle/>
+          <a:p>
+            <a:r>
+              <a:rPr lang="en-US" altLang="zh-TW" dirty="0" smtClean="0">
+                <a:solidFill>
+                  <a:srgbClr val="000000"/>
+                </a:solidFill>
+                <a:latin typeface="細明體" panose="02020509000000000000" pitchFamily="49" charset="-120"/>
+                <a:ea typeface="細明體" panose="02020509000000000000" pitchFamily="49" charset="-120"/>
+              </a:rPr>
+              <a:t> </a:t>
+            </a:r>
+            <a:r>
+              <a:rPr lang="en-US" altLang="zh-TW" dirty="0" smtClean="0">
+                <a:solidFill>
+                  <a:srgbClr val="008000"/>
+                </a:solidFill>
+                <a:latin typeface="細明體" panose="02020509000000000000" pitchFamily="49" charset="-120"/>
+                <a:ea typeface="細明體" panose="02020509000000000000" pitchFamily="49" charset="-120"/>
+              </a:rPr>
+              <a:t>// monster</a:t>
+            </a:r>
+            <a:endParaRPr lang="en-US" altLang="zh-TW" dirty="0" smtClean="0">
+              <a:solidFill>
+                <a:srgbClr val="000000"/>
+              </a:solidFill>
+              <a:latin typeface="細明體" panose="02020509000000000000" pitchFamily="49" charset="-120"/>
+              <a:ea typeface="細明體" panose="02020509000000000000" pitchFamily="49" charset="-120"/>
+            </a:endParaRPr>
+          </a:p>
+          <a:p>
+            <a:r>
+              <a:rPr lang="en-US" altLang="zh-TW" dirty="0" smtClean="0">
+                <a:solidFill>
+                  <a:srgbClr val="000000"/>
+                </a:solidFill>
+                <a:latin typeface="細明體" panose="02020509000000000000" pitchFamily="49" charset="-120"/>
+                <a:ea typeface="細明體" panose="02020509000000000000" pitchFamily="49" charset="-120"/>
+              </a:rPr>
+              <a:t>                            </a:t>
+            </a:r>
+            <a:r>
+              <a:rPr lang="en-US" altLang="zh-TW" dirty="0" err="1" smtClean="0">
+                <a:solidFill>
+                  <a:srgbClr val="000000"/>
+                </a:solidFill>
+                <a:latin typeface="細明體" panose="02020509000000000000" pitchFamily="49" charset="-120"/>
+                <a:ea typeface="細明體" panose="02020509000000000000" pitchFamily="49" charset="-120"/>
+              </a:rPr>
+              <a:t>img</a:t>
+            </a:r>
+            <a:r>
+              <a:rPr lang="en-US" altLang="zh-TW" dirty="0" smtClean="0">
+                <a:solidFill>
+                  <a:srgbClr val="000000"/>
+                </a:solidFill>
+                <a:latin typeface="細明體" panose="02020509000000000000" pitchFamily="49" charset="-120"/>
+                <a:ea typeface="細明體" panose="02020509000000000000" pitchFamily="49" charset="-120"/>
+              </a:rPr>
+              <a:t> = </a:t>
+            </a:r>
+            <a:r>
+              <a:rPr lang="en-US" altLang="zh-TW" dirty="0" smtClean="0">
+                <a:solidFill>
+                  <a:srgbClr val="0000FF"/>
+                </a:solidFill>
+                <a:latin typeface="細明體" panose="02020509000000000000" pitchFamily="49" charset="-120"/>
+                <a:ea typeface="細明體" panose="02020509000000000000" pitchFamily="49" charset="-120"/>
+              </a:rPr>
+              <a:t>new</a:t>
+            </a:r>
+            <a:r>
+              <a:rPr lang="en-US" altLang="zh-TW" dirty="0" smtClean="0">
+                <a:solidFill>
+                  <a:srgbClr val="000000"/>
+                </a:solidFill>
+                <a:latin typeface="細明體" panose="02020509000000000000" pitchFamily="49" charset="-120"/>
+                <a:ea typeface="細明體" panose="02020509000000000000" pitchFamily="49" charset="-120"/>
+              </a:rPr>
+              <a:t> </a:t>
+            </a:r>
+            <a:r>
+              <a:rPr lang="en-US" altLang="zh-TW" dirty="0" smtClean="0">
+                <a:solidFill>
+                  <a:srgbClr val="0000FF"/>
+                </a:solidFill>
+                <a:latin typeface="細明體" panose="02020509000000000000" pitchFamily="49" charset="-120"/>
+                <a:ea typeface="細明體" panose="02020509000000000000" pitchFamily="49" charset="-120"/>
+              </a:rPr>
+              <a:t>string</a:t>
+            </a:r>
+            <a:r>
+              <a:rPr lang="en-US" altLang="zh-TW" dirty="0" smtClean="0">
+                <a:solidFill>
+                  <a:srgbClr val="000000"/>
+                </a:solidFill>
+                <a:latin typeface="細明體" panose="02020509000000000000" pitchFamily="49" charset="-120"/>
+                <a:ea typeface="細明體" panose="02020509000000000000" pitchFamily="49" charset="-120"/>
+              </a:rPr>
+              <a:t>[]</a:t>
+            </a:r>
+          </a:p>
+          <a:p>
+            <a:r>
+              <a:rPr lang="zh-TW" altLang="en-US" dirty="0" smtClean="0">
+                <a:solidFill>
+                  <a:srgbClr val="000000"/>
+                </a:solidFill>
+                <a:latin typeface="細明體" panose="02020509000000000000" pitchFamily="49" charset="-120"/>
+                <a:ea typeface="細明體" panose="02020509000000000000" pitchFamily="49" charset="-120"/>
+              </a:rPr>
+              <a:t>                            </a:t>
+            </a:r>
+            <a:r>
+              <a:rPr lang="en-US" altLang="zh-TW" dirty="0" smtClean="0">
+                <a:solidFill>
+                  <a:srgbClr val="000000"/>
+                </a:solidFill>
+                <a:latin typeface="細明體" panose="02020509000000000000" pitchFamily="49" charset="-120"/>
+                <a:ea typeface="細明體" panose="02020509000000000000" pitchFamily="49" charset="-120"/>
+              </a:rPr>
+              <a:t>{</a:t>
+            </a:r>
+          </a:p>
+          <a:p>
+            <a:r>
+              <a:rPr lang="zh-TW" altLang="en-US" dirty="0" smtClean="0">
+                <a:solidFill>
+                  <a:srgbClr val="000000"/>
+                </a:solidFill>
+                <a:latin typeface="細明體" panose="02020509000000000000" pitchFamily="49" charset="-120"/>
+                <a:ea typeface="細明體" panose="02020509000000000000" pitchFamily="49" charset="-120"/>
+              </a:rPr>
+              <a:t>                                </a:t>
+            </a:r>
+            <a:r>
+              <a:rPr lang="en-US" altLang="zh-TW" dirty="0" smtClean="0">
+                <a:solidFill>
+                  <a:srgbClr val="A31515"/>
+                </a:solidFill>
+                <a:latin typeface="細明體" panose="02020509000000000000" pitchFamily="49" charset="-120"/>
+                <a:ea typeface="細明體" panose="02020509000000000000" pitchFamily="49" charset="-120"/>
+              </a:rPr>
+              <a:t>"           "</a:t>
+            </a:r>
+            <a:r>
+              <a:rPr lang="en-US" altLang="zh-TW" dirty="0" smtClean="0">
+                <a:solidFill>
+                  <a:srgbClr val="000000"/>
+                </a:solidFill>
+                <a:latin typeface="細明體" panose="02020509000000000000" pitchFamily="49" charset="-120"/>
+                <a:ea typeface="細明體" panose="02020509000000000000" pitchFamily="49" charset="-120"/>
+              </a:rPr>
+              <a:t>,</a:t>
+            </a:r>
+          </a:p>
+          <a:p>
+            <a:r>
+              <a:rPr lang="zh-TW" altLang="en-US" dirty="0" smtClean="0">
+                <a:solidFill>
+                  <a:srgbClr val="000000"/>
+                </a:solidFill>
+                <a:latin typeface="細明體" panose="02020509000000000000" pitchFamily="49" charset="-120"/>
+                <a:ea typeface="細明體" panose="02020509000000000000" pitchFamily="49" charset="-120"/>
+              </a:rPr>
+              <a:t>                                </a:t>
+            </a:r>
+            <a:r>
+              <a:rPr lang="en-US" altLang="zh-TW" dirty="0" smtClean="0">
+                <a:solidFill>
+                  <a:srgbClr val="A31515"/>
+                </a:solidFill>
+                <a:latin typeface="細明體" panose="02020509000000000000" pitchFamily="49" charset="-120"/>
+                <a:ea typeface="細明體" panose="02020509000000000000" pitchFamily="49" charset="-120"/>
+              </a:rPr>
+              <a:t>"           "</a:t>
+            </a:r>
+            <a:r>
+              <a:rPr lang="en-US" altLang="zh-TW" dirty="0" smtClean="0">
+                <a:solidFill>
+                  <a:srgbClr val="000000"/>
+                </a:solidFill>
+                <a:latin typeface="細明體" panose="02020509000000000000" pitchFamily="49" charset="-120"/>
+                <a:ea typeface="細明體" panose="02020509000000000000" pitchFamily="49" charset="-120"/>
+              </a:rPr>
+              <a:t>,</a:t>
+            </a:r>
+          </a:p>
+          <a:p>
+            <a:r>
+              <a:rPr lang="zh-TW" altLang="en-US" dirty="0" smtClean="0">
+                <a:solidFill>
+                  <a:srgbClr val="000000"/>
+                </a:solidFill>
+                <a:latin typeface="細明體" panose="02020509000000000000" pitchFamily="49" charset="-120"/>
+                <a:ea typeface="細明體" panose="02020509000000000000" pitchFamily="49" charset="-120"/>
+              </a:rPr>
+              <a:t>                                </a:t>
+            </a:r>
+            <a:r>
+              <a:rPr lang="en-US" altLang="zh-TW" dirty="0" smtClean="0">
+                <a:solidFill>
+                  <a:srgbClr val="A31515"/>
+                </a:solidFill>
+                <a:latin typeface="細明體" panose="02020509000000000000" pitchFamily="49" charset="-120"/>
+                <a:ea typeface="細明體" panose="02020509000000000000" pitchFamily="49" charset="-120"/>
+              </a:rPr>
+              <a:t>"      *    "</a:t>
+            </a:r>
+            <a:r>
+              <a:rPr lang="en-US" altLang="zh-TW" dirty="0" smtClean="0">
+                <a:solidFill>
+                  <a:srgbClr val="000000"/>
+                </a:solidFill>
+                <a:latin typeface="細明體" panose="02020509000000000000" pitchFamily="49" charset="-120"/>
+                <a:ea typeface="細明體" panose="02020509000000000000" pitchFamily="49" charset="-120"/>
+              </a:rPr>
+              <a:t>,</a:t>
+            </a:r>
+          </a:p>
+          <a:p>
+            <a:r>
+              <a:rPr lang="zh-TW" altLang="en-US" dirty="0" smtClean="0">
+                <a:solidFill>
+                  <a:srgbClr val="000000"/>
+                </a:solidFill>
+                <a:latin typeface="細明體" panose="02020509000000000000" pitchFamily="49" charset="-120"/>
+                <a:ea typeface="細明體" panose="02020509000000000000" pitchFamily="49" charset="-120"/>
+              </a:rPr>
+              <a:t>                                </a:t>
+            </a:r>
+            <a:r>
+              <a:rPr lang="en-US" altLang="zh-TW" dirty="0" smtClean="0">
+                <a:solidFill>
+                  <a:srgbClr val="A31515"/>
+                </a:solidFill>
+                <a:latin typeface="細明體" panose="02020509000000000000" pitchFamily="49" charset="-120"/>
+                <a:ea typeface="細明體" panose="02020509000000000000" pitchFamily="49" charset="-120"/>
+              </a:rPr>
+              <a:t>"     *     "</a:t>
+            </a:r>
+            <a:r>
+              <a:rPr lang="en-US" altLang="zh-TW" dirty="0" smtClean="0">
+                <a:solidFill>
+                  <a:srgbClr val="000000"/>
+                </a:solidFill>
+                <a:latin typeface="細明體" panose="02020509000000000000" pitchFamily="49" charset="-120"/>
+                <a:ea typeface="細明體" panose="02020509000000000000" pitchFamily="49" charset="-120"/>
+              </a:rPr>
+              <a:t>,</a:t>
+            </a:r>
+          </a:p>
+          <a:p>
+            <a:r>
+              <a:rPr lang="zh-TW" altLang="en-US" dirty="0" smtClean="0">
+                <a:solidFill>
+                  <a:srgbClr val="000000"/>
+                </a:solidFill>
+                <a:latin typeface="細明體" panose="02020509000000000000" pitchFamily="49" charset="-120"/>
+                <a:ea typeface="細明體" panose="02020509000000000000" pitchFamily="49" charset="-120"/>
+              </a:rPr>
+              <a:t>                                </a:t>
+            </a:r>
+            <a:r>
+              <a:rPr lang="en-US" altLang="zh-TW" dirty="0" smtClean="0">
+                <a:solidFill>
+                  <a:srgbClr val="A31515"/>
+                </a:solidFill>
+                <a:latin typeface="細明體" panose="02020509000000000000" pitchFamily="49" charset="-120"/>
+                <a:ea typeface="細明體" panose="02020509000000000000" pitchFamily="49" charset="-120"/>
+              </a:rPr>
+              <a:t>"     *     "</a:t>
+            </a:r>
+            <a:r>
+              <a:rPr lang="en-US" altLang="zh-TW" dirty="0" smtClean="0">
+                <a:solidFill>
+                  <a:srgbClr val="000000"/>
+                </a:solidFill>
+                <a:latin typeface="細明體" panose="02020509000000000000" pitchFamily="49" charset="-120"/>
+                <a:ea typeface="細明體" panose="02020509000000000000" pitchFamily="49" charset="-120"/>
+              </a:rPr>
+              <a:t>,</a:t>
+            </a:r>
+          </a:p>
+          <a:p>
+            <a:r>
+              <a:rPr lang="zh-TW" altLang="en-US" dirty="0" smtClean="0">
+                <a:solidFill>
+                  <a:srgbClr val="000000"/>
+                </a:solidFill>
+                <a:latin typeface="細明體" panose="02020509000000000000" pitchFamily="49" charset="-120"/>
+                <a:ea typeface="細明體" panose="02020509000000000000" pitchFamily="49" charset="-120"/>
+              </a:rPr>
+              <a:t>                                </a:t>
+            </a:r>
+            <a:r>
+              <a:rPr lang="en-US" altLang="zh-TW" dirty="0" smtClean="0">
+                <a:solidFill>
+                  <a:srgbClr val="A31515"/>
+                </a:solidFill>
+                <a:latin typeface="細明體" panose="02020509000000000000" pitchFamily="49" charset="-120"/>
+                <a:ea typeface="細明體" panose="02020509000000000000" pitchFamily="49" charset="-120"/>
+              </a:rPr>
+              <a:t>"   *****   "</a:t>
+            </a:r>
+            <a:r>
+              <a:rPr lang="en-US" altLang="zh-TW" dirty="0" smtClean="0">
+                <a:solidFill>
+                  <a:srgbClr val="000000"/>
+                </a:solidFill>
+                <a:latin typeface="細明體" panose="02020509000000000000" pitchFamily="49" charset="-120"/>
+                <a:ea typeface="細明體" panose="02020509000000000000" pitchFamily="49" charset="-120"/>
+              </a:rPr>
+              <a:t>,</a:t>
+            </a:r>
+          </a:p>
+          <a:p>
+            <a:r>
+              <a:rPr lang="zh-TW" altLang="en-US" dirty="0" smtClean="0">
+                <a:solidFill>
+                  <a:srgbClr val="000000"/>
+                </a:solidFill>
+                <a:latin typeface="細明體" panose="02020509000000000000" pitchFamily="49" charset="-120"/>
+                <a:ea typeface="細明體" panose="02020509000000000000" pitchFamily="49" charset="-120"/>
+              </a:rPr>
+              <a:t>                                </a:t>
+            </a:r>
+            <a:r>
+              <a:rPr lang="en-US" altLang="zh-TW" dirty="0" smtClean="0">
+                <a:solidFill>
+                  <a:srgbClr val="A31515"/>
+                </a:solidFill>
+                <a:latin typeface="細明體" panose="02020509000000000000" pitchFamily="49" charset="-120"/>
+                <a:ea typeface="細明體" panose="02020509000000000000" pitchFamily="49" charset="-120"/>
+              </a:rPr>
+              <a:t>" *** * *** "</a:t>
+            </a:r>
+            <a:r>
+              <a:rPr lang="en-US" altLang="zh-TW" dirty="0" smtClean="0">
+                <a:solidFill>
+                  <a:srgbClr val="000000"/>
+                </a:solidFill>
+                <a:latin typeface="細明體" panose="02020509000000000000" pitchFamily="49" charset="-120"/>
+                <a:ea typeface="細明體" panose="02020509000000000000" pitchFamily="49" charset="-120"/>
+              </a:rPr>
+              <a:t>,</a:t>
+            </a:r>
+          </a:p>
+          <a:p>
+            <a:r>
+              <a:rPr lang="zh-TW" altLang="en-US" dirty="0" smtClean="0">
+                <a:solidFill>
+                  <a:srgbClr val="000000"/>
+                </a:solidFill>
+                <a:latin typeface="細明體" panose="02020509000000000000" pitchFamily="49" charset="-120"/>
+                <a:ea typeface="細明體" panose="02020509000000000000" pitchFamily="49" charset="-120"/>
+              </a:rPr>
+              <a:t>                                </a:t>
+            </a:r>
+            <a:r>
+              <a:rPr lang="en-US" altLang="zh-TW" dirty="0" smtClean="0">
+                <a:solidFill>
+                  <a:srgbClr val="A31515"/>
+                </a:solidFill>
+                <a:latin typeface="細明體" panose="02020509000000000000" pitchFamily="49" charset="-120"/>
+                <a:ea typeface="細明體" panose="02020509000000000000" pitchFamily="49" charset="-120"/>
+              </a:rPr>
+              <a:t>"***********"</a:t>
+            </a:r>
+            <a:r>
+              <a:rPr lang="en-US" altLang="zh-TW" dirty="0" smtClean="0">
+                <a:solidFill>
+                  <a:srgbClr val="000000"/>
+                </a:solidFill>
+                <a:latin typeface="細明體" panose="02020509000000000000" pitchFamily="49" charset="-120"/>
+                <a:ea typeface="細明體" panose="02020509000000000000" pitchFamily="49" charset="-120"/>
+              </a:rPr>
+              <a:t>,</a:t>
+            </a:r>
+          </a:p>
+          <a:p>
+            <a:r>
+              <a:rPr lang="zh-TW" altLang="en-US" dirty="0" smtClean="0">
+                <a:solidFill>
+                  <a:srgbClr val="000000"/>
+                </a:solidFill>
+                <a:latin typeface="細明體" panose="02020509000000000000" pitchFamily="49" charset="-120"/>
+                <a:ea typeface="細明體" panose="02020509000000000000" pitchFamily="49" charset="-120"/>
+              </a:rPr>
+              <a:t>                                </a:t>
+            </a:r>
+            <a:r>
+              <a:rPr lang="en-US" altLang="zh-TW" dirty="0" smtClean="0">
+                <a:solidFill>
+                  <a:srgbClr val="A31515"/>
+                </a:solidFill>
+                <a:latin typeface="細明體" panose="02020509000000000000" pitchFamily="49" charset="-120"/>
+                <a:ea typeface="細明體" panose="02020509000000000000" pitchFamily="49" charset="-120"/>
+              </a:rPr>
+              <a:t>" ********* "</a:t>
+            </a:r>
+            <a:r>
+              <a:rPr lang="en-US" altLang="zh-TW" dirty="0" smtClean="0">
+                <a:solidFill>
+                  <a:srgbClr val="000000"/>
+                </a:solidFill>
+                <a:latin typeface="細明體" panose="02020509000000000000" pitchFamily="49" charset="-120"/>
+                <a:ea typeface="細明體" panose="02020509000000000000" pitchFamily="49" charset="-120"/>
+              </a:rPr>
+              <a:t>,</a:t>
+            </a:r>
+          </a:p>
+          <a:p>
+            <a:r>
+              <a:rPr lang="zh-TW" altLang="en-US" dirty="0" smtClean="0">
+                <a:solidFill>
+                  <a:srgbClr val="000000"/>
+                </a:solidFill>
+                <a:latin typeface="細明體" panose="02020509000000000000" pitchFamily="49" charset="-120"/>
+                <a:ea typeface="細明體" panose="02020509000000000000" pitchFamily="49" charset="-120"/>
+              </a:rPr>
+              <a:t>                                </a:t>
+            </a:r>
+            <a:r>
+              <a:rPr lang="en-US" altLang="zh-TW" dirty="0" smtClean="0">
+                <a:solidFill>
+                  <a:srgbClr val="A31515"/>
+                </a:solidFill>
+                <a:latin typeface="細明體" panose="02020509000000000000" pitchFamily="49" charset="-120"/>
+                <a:ea typeface="細明體" panose="02020509000000000000" pitchFamily="49" charset="-120"/>
+              </a:rPr>
+              <a:t>"           "</a:t>
+            </a:r>
+            <a:r>
+              <a:rPr lang="en-US" altLang="zh-TW" dirty="0" smtClean="0">
+                <a:solidFill>
+                  <a:srgbClr val="000000"/>
+                </a:solidFill>
+                <a:latin typeface="細明體" panose="02020509000000000000" pitchFamily="49" charset="-120"/>
+                <a:ea typeface="細明體" panose="02020509000000000000" pitchFamily="49" charset="-120"/>
+              </a:rPr>
+              <a:t>,</a:t>
+            </a:r>
+          </a:p>
+          <a:p>
+            <a:r>
+              <a:rPr lang="zh-TW" altLang="en-US" dirty="0" smtClean="0">
+                <a:solidFill>
+                  <a:srgbClr val="000000"/>
+                </a:solidFill>
+                <a:latin typeface="細明體" panose="02020509000000000000" pitchFamily="49" charset="-120"/>
+                <a:ea typeface="細明體" panose="02020509000000000000" pitchFamily="49" charset="-120"/>
+              </a:rPr>
+              <a:t>                                </a:t>
+            </a:r>
+            <a:r>
+              <a:rPr lang="en-US" altLang="zh-TW" dirty="0" smtClean="0">
+                <a:solidFill>
+                  <a:srgbClr val="A31515"/>
+                </a:solidFill>
+                <a:latin typeface="細明體" panose="02020509000000000000" pitchFamily="49" charset="-120"/>
+                <a:ea typeface="細明體" panose="02020509000000000000" pitchFamily="49" charset="-120"/>
+              </a:rPr>
+              <a:t>"           "</a:t>
+            </a:r>
+            <a:endParaRPr lang="zh-TW" altLang="en-US" dirty="0"/>
+          </a:p>
+        </p:txBody>
+      </p:sp>
     </p:spTree>
     <p:extLst>
       <p:ext uri="{BB962C8B-B14F-4D97-AF65-F5344CB8AC3E}">

</xml_diff>